<commit_message>
added content about collections
</commit_message>
<xml_diff>
--- a/week2/week2_slideshow.pptx
+++ b/week2/week2_slideshow.pptx
@@ -20,9 +20,14 @@
     <p:sldId id="269" r:id="rId14"/>
     <p:sldId id="270" r:id="rId15"/>
     <p:sldId id="271" r:id="rId16"/>
-    <p:sldId id="272" r:id="rId17"/>
-    <p:sldId id="273" r:id="rId18"/>
-    <p:sldId id="274" r:id="rId19"/>
+    <p:sldId id="275" r:id="rId17"/>
+    <p:sldId id="276" r:id="rId18"/>
+    <p:sldId id="277" r:id="rId19"/>
+    <p:sldId id="278" r:id="rId20"/>
+    <p:sldId id="279" r:id="rId21"/>
+    <p:sldId id="272" r:id="rId22"/>
+    <p:sldId id="273" r:id="rId23"/>
+    <p:sldId id="274" r:id="rId24"/>
   </p:sldIdLst>
   <p:sldSz cx="12192000" cy="6858000"/>
   <p:notesSz cx="6858000" cy="9144000"/>
@@ -403,7 +408,7 @@
           <a:p>
             <a:fld id="{34891F7B-7391-4F87-9AA4-1E9AC2164F40}" type="datetimeFigureOut">
               <a:rPr lang="en-US" smtClean="0"/>
-              <a:t>03-Nov-21</a:t>
+              <a:t>08-Nov-21</a:t>
             </a:fld>
             <a:endParaRPr lang="en-US"/>
           </a:p>
@@ -817,7 +822,7 @@
           <a:p>
             <a:fld id="{34891F7B-7391-4F87-9AA4-1E9AC2164F40}" type="datetimeFigureOut">
               <a:rPr lang="en-US" smtClean="0"/>
-              <a:t>03-Nov-21</a:t>
+              <a:t>08-Nov-21</a:t>
             </a:fld>
             <a:endParaRPr lang="en-US"/>
           </a:p>
@@ -1153,7 +1158,7 @@
           <a:p>
             <a:fld id="{34891F7B-7391-4F87-9AA4-1E9AC2164F40}" type="datetimeFigureOut">
               <a:rPr lang="en-US" smtClean="0"/>
-              <a:t>03-Nov-21</a:t>
+              <a:t>08-Nov-21</a:t>
             </a:fld>
             <a:endParaRPr lang="en-US"/>
           </a:p>
@@ -1558,7 +1563,7 @@
           <a:p>
             <a:fld id="{34891F7B-7391-4F87-9AA4-1E9AC2164F40}" type="datetimeFigureOut">
               <a:rPr lang="en-US" smtClean="0"/>
-              <a:t>03-Nov-21</a:t>
+              <a:t>08-Nov-21</a:t>
             </a:fld>
             <a:endParaRPr lang="en-US"/>
           </a:p>
@@ -2126,7 +2131,7 @@
           <a:p>
             <a:fld id="{34891F7B-7391-4F87-9AA4-1E9AC2164F40}" type="datetimeFigureOut">
               <a:rPr lang="en-US" smtClean="0"/>
-              <a:t>03-Nov-21</a:t>
+              <a:t>08-Nov-21</a:t>
             </a:fld>
             <a:endParaRPr lang="en-US"/>
           </a:p>
@@ -2807,7 +2812,7 @@
           <a:p>
             <a:fld id="{34891F7B-7391-4F87-9AA4-1E9AC2164F40}" type="datetimeFigureOut">
               <a:rPr lang="en-US" smtClean="0"/>
-              <a:t>03-Nov-21</a:t>
+              <a:t>08-Nov-21</a:t>
             </a:fld>
             <a:endParaRPr lang="en-US"/>
           </a:p>
@@ -3720,7 +3725,7 @@
           <a:p>
             <a:fld id="{34891F7B-7391-4F87-9AA4-1E9AC2164F40}" type="datetimeFigureOut">
               <a:rPr lang="en-US" smtClean="0"/>
-              <a:t>03-Nov-21</a:t>
+              <a:t>08-Nov-21</a:t>
             </a:fld>
             <a:endParaRPr lang="en-US"/>
           </a:p>
@@ -4033,7 +4038,7 @@
           <a:p>
             <a:fld id="{34891F7B-7391-4F87-9AA4-1E9AC2164F40}" type="datetimeFigureOut">
               <a:rPr lang="en-US" smtClean="0"/>
-              <a:t>03-Nov-21</a:t>
+              <a:t>08-Nov-21</a:t>
             </a:fld>
             <a:endParaRPr lang="en-US"/>
           </a:p>
@@ -4297,7 +4302,7 @@
           <a:p>
             <a:fld id="{34891F7B-7391-4F87-9AA4-1E9AC2164F40}" type="datetimeFigureOut">
               <a:rPr lang="en-US" smtClean="0"/>
-              <a:t>03-Nov-21</a:t>
+              <a:t>08-Nov-21</a:t>
             </a:fld>
             <a:endParaRPr lang="en-US"/>
           </a:p>
@@ -4620,7 +4625,7 @@
           <a:p>
             <a:fld id="{34891F7B-7391-4F87-9AA4-1E9AC2164F40}" type="datetimeFigureOut">
               <a:rPr lang="en-US" smtClean="0"/>
-              <a:t>03-Nov-21</a:t>
+              <a:t>08-Nov-21</a:t>
             </a:fld>
             <a:endParaRPr lang="en-US"/>
           </a:p>
@@ -5009,7 +5014,7 @@
           <a:p>
             <a:fld id="{34891F7B-7391-4F87-9AA4-1E9AC2164F40}" type="datetimeFigureOut">
               <a:rPr lang="en-US" smtClean="0"/>
-              <a:t>03-Nov-21</a:t>
+              <a:t>08-Nov-21</a:t>
             </a:fld>
             <a:endParaRPr lang="en-US"/>
           </a:p>
@@ -5385,7 +5390,7 @@
           <a:p>
             <a:fld id="{34891F7B-7391-4F87-9AA4-1E9AC2164F40}" type="datetimeFigureOut">
               <a:rPr lang="en-US" smtClean="0"/>
-              <a:t>03-Nov-21</a:t>
+              <a:t>08-Nov-21</a:t>
             </a:fld>
             <a:endParaRPr lang="en-US"/>
           </a:p>
@@ -5891,7 +5896,7 @@
           <a:p>
             <a:fld id="{34891F7B-7391-4F87-9AA4-1E9AC2164F40}" type="datetimeFigureOut">
               <a:rPr lang="en-US" smtClean="0"/>
-              <a:t>03-Nov-21</a:t>
+              <a:t>08-Nov-21</a:t>
             </a:fld>
             <a:endParaRPr lang="en-US"/>
           </a:p>
@@ -6148,7 +6153,7 @@
           <a:p>
             <a:fld id="{34891F7B-7391-4F87-9AA4-1E9AC2164F40}" type="datetimeFigureOut">
               <a:rPr lang="en-US" smtClean="0"/>
-              <a:t>03-Nov-21</a:t>
+              <a:t>08-Nov-21</a:t>
             </a:fld>
             <a:endParaRPr lang="en-US"/>
           </a:p>
@@ -6311,7 +6316,7 @@
           <a:p>
             <a:fld id="{34891F7B-7391-4F87-9AA4-1E9AC2164F40}" type="datetimeFigureOut">
               <a:rPr lang="en-US" smtClean="0"/>
-              <a:t>03-Nov-21</a:t>
+              <a:t>08-Nov-21</a:t>
             </a:fld>
             <a:endParaRPr lang="en-US"/>
           </a:p>
@@ -6701,7 +6706,7 @@
           <a:p>
             <a:fld id="{34891F7B-7391-4F87-9AA4-1E9AC2164F40}" type="datetimeFigureOut">
               <a:rPr lang="en-US" smtClean="0"/>
-              <a:t>03-Nov-21</a:t>
+              <a:t>08-Nov-21</a:t>
             </a:fld>
             <a:endParaRPr lang="en-US"/>
           </a:p>
@@ -7110,7 +7115,7 @@
           <a:p>
             <a:fld id="{34891F7B-7391-4F87-9AA4-1E9AC2164F40}" type="datetimeFigureOut">
               <a:rPr lang="en-US" smtClean="0"/>
-              <a:t>03-Nov-21</a:t>
+              <a:t>08-Nov-21</a:t>
             </a:fld>
             <a:endParaRPr lang="en-US"/>
           </a:p>
@@ -7354,7 +7359,7 @@
           <a:p>
             <a:fld id="{34891F7B-7391-4F87-9AA4-1E9AC2164F40}" type="datetimeFigureOut">
               <a:rPr lang="en-US" smtClean="0"/>
-              <a:t>03-Nov-21</a:t>
+              <a:t>08-Nov-21</a:t>
             </a:fld>
             <a:endParaRPr lang="en-US"/>
           </a:p>
@@ -8986,7 +8991,7 @@
           <p:cNvPr id="2" name="Title 1">
             <a:extLst>
               <a:ext uri="{FF2B5EF4-FFF2-40B4-BE49-F238E27FC236}">
-                <a16:creationId xmlns:a16="http://schemas.microsoft.com/office/drawing/2014/main" id="{52D66434-1471-4775-B83D-AEB6FE11936E}"/>
+                <a16:creationId xmlns:a16="http://schemas.microsoft.com/office/drawing/2014/main" id="{D215851C-23AE-425A-8B65-2DFA1B21EF5C}"/>
               </a:ext>
             </a:extLst>
           </p:cNvPr>
@@ -9004,7 +9009,7 @@
           <a:p>
             <a:r>
               <a:rPr lang="en-US" dirty="0"/>
-              <a:t>Control flow: if/else if/else, switch</a:t>
+              <a:t>Collections: List</a:t>
             </a:r>
           </a:p>
         </p:txBody>
@@ -9014,7 +9019,7 @@
           <p:cNvPr id="4" name="Content Placeholder 3">
             <a:extLst>
               <a:ext uri="{FF2B5EF4-FFF2-40B4-BE49-F238E27FC236}">
-                <a16:creationId xmlns:a16="http://schemas.microsoft.com/office/drawing/2014/main" id="{3FCB5667-22AC-47A9-8185-C6383F48D485}"/>
+                <a16:creationId xmlns:a16="http://schemas.microsoft.com/office/drawing/2014/main" id="{82FA0B12-0554-407A-B0D6-E7D7A637DDC6}"/>
               </a:ext>
             </a:extLst>
           </p:cNvPr>
@@ -9025,56 +9030,76 @@
             <p:ph sz="half" idx="2"/>
           </p:nvPr>
         </p:nvSpPr>
-        <p:spPr/>
+        <p:spPr>
+          <a:xfrm>
+            <a:off x="294335" y="2336872"/>
+            <a:ext cx="4700058" cy="3599316"/>
+          </a:xfrm>
+        </p:spPr>
         <p:txBody>
           <a:bodyPr/>
           <a:lstStyle/>
           <a:p>
-            <a:endParaRPr lang="en-US"/>
-          </a:p>
-        </p:txBody>
-      </p:sp>
-      <p:sp>
-        <p:nvSpPr>
-          <p:cNvPr id="11" name="TextBox 10">
-            <a:extLst>
-              <a:ext uri="{FF2B5EF4-FFF2-40B4-BE49-F238E27FC236}">
-                <a16:creationId xmlns:a16="http://schemas.microsoft.com/office/drawing/2014/main" id="{566A6A39-4690-4B3A-A6B1-DA8FAC1623A7}"/>
-              </a:ext>
-            </a:extLst>
-          </p:cNvPr>
-          <p:cNvSpPr txBox="1"/>
-          <p:nvPr/>
-        </p:nvSpPr>
-        <p:spPr>
-          <a:xfrm>
-            <a:off x="680320" y="5131836"/>
-            <a:ext cx="3881534" cy="369332"/>
-          </a:xfrm>
-          <a:prstGeom prst="rect">
-            <a:avLst/>
-          </a:prstGeom>
-          <a:noFill/>
-        </p:spPr>
-        <p:txBody>
-          <a:bodyPr wrap="square" rtlCol="0">
-            <a:spAutoFit/>
-          </a:bodyPr>
-          <a:lstStyle/>
-          <a:p>
+            <a:r>
+              <a:rPr lang="en-US" dirty="0" err="1"/>
+              <a:t>Zet</a:t>
+            </a:r>
             <a:r>
               <a:rPr lang="en-US" dirty="0"/>
-              <a:t>Pretty much identical</a:t>
-            </a:r>
+              <a:t> type info voor je collections</a:t>
+            </a:r>
+          </a:p>
+          <a:p>
+            <a:r>
+              <a:rPr lang="en-US" dirty="0"/>
+              <a:t>Common List operations</a:t>
+            </a:r>
+          </a:p>
+          <a:p>
+            <a:r>
+              <a:rPr lang="en-US" dirty="0" err="1"/>
+              <a:t>Gebruik</a:t>
+            </a:r>
+            <a:r>
+              <a:rPr lang="en-US" dirty="0"/>
+              <a:t> .length niet om te </a:t>
+            </a:r>
+            <a:r>
+              <a:rPr lang="en-US" dirty="0" err="1"/>
+              <a:t>checken</a:t>
+            </a:r>
+            <a:r>
+              <a:rPr lang="en-US" dirty="0"/>
+              <a:t> of </a:t>
+            </a:r>
+            <a:r>
+              <a:rPr lang="en-US" dirty="0" err="1"/>
+              <a:t>iets</a:t>
+            </a:r>
+            <a:r>
+              <a:rPr lang="en-US" dirty="0"/>
+              <a:t> </a:t>
+            </a:r>
+            <a:r>
+              <a:rPr lang="en-US" dirty="0" err="1"/>
+              <a:t>leeg</a:t>
+            </a:r>
+            <a:r>
+              <a:rPr lang="en-US" dirty="0"/>
+              <a:t> is of niet</a:t>
+            </a:r>
+          </a:p>
+          <a:p>
+            <a:endParaRPr lang="en-US" dirty="0"/>
           </a:p>
         </p:txBody>
       </p:sp>
       <p:pic>
         <p:nvPicPr>
-          <p:cNvPr id="15" name="Picture 14">
+          <p:cNvPr id="12" name="Picture 11">
             <a:extLst>
               <a:ext uri="{FF2B5EF4-FFF2-40B4-BE49-F238E27FC236}">
-                <a16:creationId xmlns:a16="http://schemas.microsoft.com/office/drawing/2014/main" id="{F182A34A-CEF0-4D7A-A51E-13731177685B}"/>
+                <a16:creationId xmlns:a16="http://schemas.microsoft.com/office/drawing/2014/main" id="{FD683C2C-EF32-4A84-B804-F86EC23C7ABE}"/>
               </a:ext>
             </a:extLst>
           </p:cNvPr>
@@ -9091,8 +9116,8 @@
         </p:blipFill>
         <p:spPr>
           <a:xfrm>
-            <a:off x="0" y="1976235"/>
-            <a:ext cx="6916115" cy="2905530"/>
+            <a:off x="5545284" y="2120742"/>
+            <a:ext cx="6352381" cy="1152381"/>
           </a:xfrm>
           <a:prstGeom prst="rect">
             <a:avLst/>
@@ -9101,10 +9126,10 @@
       </p:pic>
       <p:pic>
         <p:nvPicPr>
-          <p:cNvPr id="17" name="Picture 16">
+          <p:cNvPr id="14" name="Picture 13">
             <a:extLst>
               <a:ext uri="{FF2B5EF4-FFF2-40B4-BE49-F238E27FC236}">
-                <a16:creationId xmlns:a16="http://schemas.microsoft.com/office/drawing/2014/main" id="{2598C180-AA11-4C1D-A599-A7E9DCF614E0}"/>
+                <a16:creationId xmlns:a16="http://schemas.microsoft.com/office/drawing/2014/main" id="{5CB02D1F-8FFF-44B5-BAAC-FBC2CBB7407E}"/>
               </a:ext>
             </a:extLst>
           </p:cNvPr>
@@ -9121,8 +9146,8 @@
         </p:blipFill>
         <p:spPr>
           <a:xfrm>
-            <a:off x="7088724" y="1976235"/>
-            <a:ext cx="5103276" cy="4881765"/>
+            <a:off x="5545284" y="3356366"/>
+            <a:ext cx="5895238" cy="3038095"/>
           </a:xfrm>
           <a:prstGeom prst="rect">
             <a:avLst/>
@@ -9132,7 +9157,7 @@
     </p:spTree>
     <p:extLst>
       <p:ext uri="{BB962C8B-B14F-4D97-AF65-F5344CB8AC3E}">
-        <p14:creationId xmlns:p14="http://schemas.microsoft.com/office/powerpoint/2010/main" val="2492827843"/>
+        <p14:creationId xmlns:p14="http://schemas.microsoft.com/office/powerpoint/2010/main" val="2829284795"/>
       </p:ext>
     </p:extLst>
   </p:cSld>
@@ -9164,7 +9189,7 @@
           <p:cNvPr id="2" name="Title 1">
             <a:extLst>
               <a:ext uri="{FF2B5EF4-FFF2-40B4-BE49-F238E27FC236}">
-                <a16:creationId xmlns:a16="http://schemas.microsoft.com/office/drawing/2014/main" id="{98A23850-E6EB-4B26-8529-54DF737B18D5}"/>
+                <a16:creationId xmlns:a16="http://schemas.microsoft.com/office/drawing/2014/main" id="{F88C0C48-5A06-42DF-BAA5-A07EA04B015F}"/>
               </a:ext>
             </a:extLst>
           </p:cNvPr>
@@ -9175,40 +9200,40 @@
             <p:ph type="title"/>
           </p:nvPr>
         </p:nvSpPr>
+        <p:spPr>
+          <a:xfrm>
+            <a:off x="680321" y="753228"/>
+            <a:ext cx="3518455" cy="1080938"/>
+          </a:xfrm>
+        </p:spPr>
+        <p:txBody>
+          <a:bodyPr/>
+          <a:lstStyle/>
+          <a:p>
+            <a:r>
+              <a:rPr lang="en-US" dirty="0"/>
+              <a:t>Lists</a:t>
+            </a:r>
+          </a:p>
+        </p:txBody>
+      </p:sp>
+      <p:sp>
+        <p:nvSpPr>
+          <p:cNvPr id="3" name="Content Placeholder 2">
+            <a:extLst>
+              <a:ext uri="{FF2B5EF4-FFF2-40B4-BE49-F238E27FC236}">
+                <a16:creationId xmlns:a16="http://schemas.microsoft.com/office/drawing/2014/main" id="{F6EEB66B-0B40-40DE-A1C1-E69A9742DBD6}"/>
+              </a:ext>
+            </a:extLst>
+          </p:cNvPr>
+          <p:cNvSpPr>
+            <a:spLocks noGrp="1"/>
+          </p:cNvSpPr>
+          <p:nvPr>
+            <p:ph sz="half" idx="1"/>
+          </p:nvPr>
+        </p:nvSpPr>
         <p:spPr/>
-        <p:txBody>
-          <a:bodyPr/>
-          <a:lstStyle/>
-          <a:p>
-            <a:r>
-              <a:rPr lang="en-US" dirty="0"/>
-              <a:t>Control flow: for loops</a:t>
-            </a:r>
-          </a:p>
-        </p:txBody>
-      </p:sp>
-      <p:sp>
-        <p:nvSpPr>
-          <p:cNvPr id="3" name="Content Placeholder 2">
-            <a:extLst>
-              <a:ext uri="{FF2B5EF4-FFF2-40B4-BE49-F238E27FC236}">
-                <a16:creationId xmlns:a16="http://schemas.microsoft.com/office/drawing/2014/main" id="{8A758808-704D-4107-868A-B122E3109F2C}"/>
-              </a:ext>
-            </a:extLst>
-          </p:cNvPr>
-          <p:cNvSpPr>
-            <a:spLocks noGrp="1"/>
-          </p:cNvSpPr>
-          <p:nvPr>
-            <p:ph sz="half" idx="1"/>
-          </p:nvPr>
-        </p:nvSpPr>
-        <p:spPr>
-          <a:xfrm>
-            <a:off x="680320" y="2336872"/>
-            <a:ext cx="4698358" cy="4455814"/>
-          </a:xfrm>
-        </p:spPr>
         <p:txBody>
           <a:bodyPr>
             <a:normAutofit lnSpcReduction="10000"/>
@@ -9217,7 +9242,7 @@
           <a:p>
             <a:r>
               <a:rPr lang="en-US" dirty="0"/>
-              <a:t>Short method</a:t>
+              <a:t>Spread operator</a:t>
             </a:r>
           </a:p>
           <a:p>
@@ -9229,7 +9254,7 @@
           <a:p>
             <a:r>
               <a:rPr lang="en-US" dirty="0"/>
-              <a:t>Longer method</a:t>
+              <a:t>Collection if</a:t>
             </a:r>
           </a:p>
           <a:p>
@@ -9239,68 +9264,34 @@
             <a:endParaRPr lang="en-US" dirty="0"/>
           </a:p>
           <a:p>
-            <a:r>
-              <a:rPr lang="en-US" dirty="0" err="1"/>
-              <a:t>forEach</a:t>
-            </a:r>
             <a:endParaRPr lang="en-US" dirty="0"/>
           </a:p>
           <a:p>
+            <a:r>
+              <a:rPr lang="en-US" dirty="0"/>
+              <a:t>Collection for</a:t>
+            </a:r>
+          </a:p>
+          <a:p>
             <a:endParaRPr lang="en-US" dirty="0"/>
           </a:p>
           <a:p>
             <a:endParaRPr lang="en-US" dirty="0"/>
           </a:p>
           <a:p>
-            <a:r>
-              <a:rPr lang="en-US" dirty="0" err="1"/>
-              <a:t>forEach</a:t>
-            </a:r>
-            <a:r>
-              <a:rPr lang="en-US" dirty="0"/>
-              <a:t> </a:t>
-            </a:r>
-            <a:r>
-              <a:rPr lang="en-US" dirty="0" err="1"/>
-              <a:t>oneliner</a:t>
-            </a:r>
             <a:endParaRPr lang="en-US" dirty="0"/>
           </a:p>
-        </p:txBody>
-      </p:sp>
-      <p:sp>
-        <p:nvSpPr>
-          <p:cNvPr id="4" name="Content Placeholder 3">
-            <a:extLst>
-              <a:ext uri="{FF2B5EF4-FFF2-40B4-BE49-F238E27FC236}">
-                <a16:creationId xmlns:a16="http://schemas.microsoft.com/office/drawing/2014/main" id="{14D767FE-1667-4BE6-8AE7-F84C8C45F384}"/>
-              </a:ext>
-            </a:extLst>
-          </p:cNvPr>
-          <p:cNvSpPr>
-            <a:spLocks noGrp="1"/>
-          </p:cNvSpPr>
-          <p:nvPr>
-            <p:ph sz="half" idx="2"/>
-          </p:nvPr>
-        </p:nvSpPr>
-        <p:spPr/>
-        <p:txBody>
-          <a:bodyPr>
-            <a:normAutofit lnSpcReduction="10000"/>
-          </a:bodyPr>
-          <a:lstStyle/>
-          <a:p>
-            <a:endParaRPr lang="en-US"/>
+          <a:p>
+            <a:endParaRPr lang="en-US" dirty="0"/>
           </a:p>
         </p:txBody>
       </p:sp>
       <p:pic>
         <p:nvPicPr>
-          <p:cNvPr id="6" name="Picture 5">
+          <p:cNvPr id="14" name="Picture 13">
             <a:extLst>
               <a:ext uri="{FF2B5EF4-FFF2-40B4-BE49-F238E27FC236}">
-                <a16:creationId xmlns:a16="http://schemas.microsoft.com/office/drawing/2014/main" id="{BF5F5EDF-B748-4DC2-B3F2-62DFA00BCD3A}"/>
+                <a16:creationId xmlns:a16="http://schemas.microsoft.com/office/drawing/2014/main" id="{3C4EFA0F-E958-4EC8-9280-ABF7D4518D43}"/>
               </a:ext>
             </a:extLst>
           </p:cNvPr>
@@ -9317,8 +9308,38 @@
         </p:blipFill>
         <p:spPr>
           <a:xfrm>
-            <a:off x="5192000" y="2010381"/>
-            <a:ext cx="7000000" cy="4847619"/>
+            <a:off x="4572952" y="1564079"/>
+            <a:ext cx="7380952" cy="2161905"/>
+          </a:xfrm>
+          <a:prstGeom prst="rect">
+            <a:avLst/>
+          </a:prstGeom>
+        </p:spPr>
+      </p:pic>
+      <p:pic>
+        <p:nvPicPr>
+          <p:cNvPr id="20" name="Picture 19">
+            <a:extLst>
+              <a:ext uri="{FF2B5EF4-FFF2-40B4-BE49-F238E27FC236}">
+                <a16:creationId xmlns:a16="http://schemas.microsoft.com/office/drawing/2014/main" id="{ABFDEDC5-4869-4E53-A68E-916578C15F08}"/>
+              </a:ext>
+            </a:extLst>
+          </p:cNvPr>
+          <p:cNvPicPr>
+            <a:picLocks noChangeAspect="1"/>
+          </p:cNvPicPr>
+          <p:nvPr/>
+        </p:nvPicPr>
+        <p:blipFill>
+          <a:blip r:embed="rId3"/>
+          <a:stretch>
+            <a:fillRect/>
+          </a:stretch>
+        </p:blipFill>
+        <p:spPr>
+          <a:xfrm>
+            <a:off x="4496762" y="3800857"/>
+            <a:ext cx="7533333" cy="3057143"/>
           </a:xfrm>
           <a:prstGeom prst="rect">
             <a:avLst/>
@@ -9328,7 +9349,7 @@
     </p:spTree>
     <p:extLst>
       <p:ext uri="{BB962C8B-B14F-4D97-AF65-F5344CB8AC3E}">
-        <p14:creationId xmlns:p14="http://schemas.microsoft.com/office/powerpoint/2010/main" val="231782438"/>
+        <p14:creationId xmlns:p14="http://schemas.microsoft.com/office/powerpoint/2010/main" val="2001035284"/>
       </p:ext>
     </p:extLst>
   </p:cSld>
@@ -9360,7 +9381,7 @@
           <p:cNvPr id="2" name="Title 1">
             <a:extLst>
               <a:ext uri="{FF2B5EF4-FFF2-40B4-BE49-F238E27FC236}">
-                <a16:creationId xmlns:a16="http://schemas.microsoft.com/office/drawing/2014/main" id="{B9CE91F1-0C04-4DB5-9295-6E468DE1FBDA}"/>
+                <a16:creationId xmlns:a16="http://schemas.microsoft.com/office/drawing/2014/main" id="{0F8A8DCC-8227-429B-BD94-0432585CE950}"/>
               </a:ext>
             </a:extLst>
           </p:cNvPr>
@@ -9378,8 +9399,69 @@
           <a:p>
             <a:r>
               <a:rPr lang="en-US" dirty="0"/>
-              <a:t>Control flow: continue and break</a:t>
-            </a:r>
+              <a:t>Lists</a:t>
+            </a:r>
+          </a:p>
+        </p:txBody>
+      </p:sp>
+      <p:sp>
+        <p:nvSpPr>
+          <p:cNvPr id="3" name="Content Placeholder 2">
+            <a:extLst>
+              <a:ext uri="{FF2B5EF4-FFF2-40B4-BE49-F238E27FC236}">
+                <a16:creationId xmlns:a16="http://schemas.microsoft.com/office/drawing/2014/main" id="{E910CB61-C19A-4A0E-832C-E8E71FAC975C}"/>
+              </a:ext>
+            </a:extLst>
+          </p:cNvPr>
+          <p:cNvSpPr>
+            <a:spLocks noGrp="1"/>
+          </p:cNvSpPr>
+          <p:nvPr>
+            <p:ph sz="half" idx="1"/>
+          </p:nvPr>
+        </p:nvSpPr>
+        <p:spPr/>
+        <p:txBody>
+          <a:bodyPr/>
+          <a:lstStyle/>
+          <a:p>
+            <a:r>
+              <a:rPr lang="en-US" dirty="0"/>
+              <a:t>Looping</a:t>
+            </a:r>
+          </a:p>
+          <a:p>
+            <a:endParaRPr lang="en-US" dirty="0"/>
+          </a:p>
+          <a:p>
+            <a:endParaRPr lang="en-US" dirty="0"/>
+          </a:p>
+          <a:p>
+            <a:endParaRPr lang="en-US" dirty="0"/>
+          </a:p>
+          <a:p>
+            <a:endParaRPr lang="en-US" dirty="0"/>
+          </a:p>
+          <a:p>
+            <a:endParaRPr lang="en-US" dirty="0"/>
+          </a:p>
+          <a:p>
+            <a:endParaRPr lang="en-US" dirty="0"/>
+          </a:p>
+          <a:p>
+            <a:endParaRPr lang="en-US" dirty="0"/>
+          </a:p>
+          <a:p>
+            <a:endParaRPr lang="en-US" dirty="0"/>
+          </a:p>
+          <a:p>
+            <a:endParaRPr lang="en-US" dirty="0"/>
+          </a:p>
+          <a:p>
+            <a:endParaRPr lang="en-US" dirty="0"/>
+          </a:p>
+          <a:p>
+            <a:endParaRPr lang="en-US" dirty="0"/>
           </a:p>
         </p:txBody>
       </p:sp>
@@ -9388,7 +9470,7 @@
           <p:cNvPr id="10" name="Picture 9">
             <a:extLst>
               <a:ext uri="{FF2B5EF4-FFF2-40B4-BE49-F238E27FC236}">
-                <a16:creationId xmlns:a16="http://schemas.microsoft.com/office/drawing/2014/main" id="{3CF32824-DAEF-4E54-902D-56C528060128}"/>
+                <a16:creationId xmlns:a16="http://schemas.microsoft.com/office/drawing/2014/main" id="{378E732C-3233-4C9F-97E8-9998FB145AA4}"/>
               </a:ext>
             </a:extLst>
           </p:cNvPr>
@@ -9405,88 +9487,187 @@
         </p:blipFill>
         <p:spPr>
           <a:xfrm>
-            <a:off x="5801524" y="1969277"/>
-            <a:ext cx="6390476" cy="3628571"/>
+            <a:off x="4296762" y="2056954"/>
+            <a:ext cx="7895238" cy="2428571"/>
           </a:xfrm>
           <a:prstGeom prst="rect">
             <a:avLst/>
           </a:prstGeom>
         </p:spPr>
       </p:pic>
-      <p:sp>
-        <p:nvSpPr>
-          <p:cNvPr id="11" name="TextBox 10">
+    </p:spTree>
+    <p:extLst>
+      <p:ext uri="{BB962C8B-B14F-4D97-AF65-F5344CB8AC3E}">
+        <p14:creationId xmlns:p14="http://schemas.microsoft.com/office/powerpoint/2010/main" val="881767801"/>
+      </p:ext>
+    </p:extLst>
+  </p:cSld>
+  <p:clrMapOvr>
+    <a:masterClrMapping/>
+  </p:clrMapOvr>
+</p:sld>
+</file>
+
+<file path=ppt/slides/slide19.xml><?xml version="1.0" encoding="utf-8"?>
+<p:sld xmlns:a="http://schemas.openxmlformats.org/drawingml/2006/main" xmlns:r="http://schemas.openxmlformats.org/officeDocument/2006/relationships" xmlns:p="http://schemas.openxmlformats.org/presentationml/2006/main">
+  <p:cSld>
+    <p:spTree>
+      <p:nvGrpSpPr>
+        <p:cNvPr id="1" name=""/>
+        <p:cNvGrpSpPr/>
+        <p:nvPr/>
+      </p:nvGrpSpPr>
+      <p:grpSpPr>
+        <a:xfrm>
+          <a:off x="0" y="0"/>
+          <a:ext cx="0" cy="0"/>
+          <a:chOff x="0" y="0"/>
+          <a:chExt cx="0" cy="0"/>
+        </a:xfrm>
+      </p:grpSpPr>
+      <p:sp>
+        <p:nvSpPr>
+          <p:cNvPr id="2" name="Title 1">
             <a:extLst>
               <a:ext uri="{FF2B5EF4-FFF2-40B4-BE49-F238E27FC236}">
-                <a16:creationId xmlns:a16="http://schemas.microsoft.com/office/drawing/2014/main" id="{BC524871-525B-4095-B9C4-61FB1196B99D}"/>
+                <a16:creationId xmlns:a16="http://schemas.microsoft.com/office/drawing/2014/main" id="{A2A5F1C9-BD03-4276-805F-6711B970AE22}"/>
               </a:ext>
             </a:extLst>
           </p:cNvPr>
-          <p:cNvSpPr txBox="1"/>
+          <p:cNvSpPr>
+            <a:spLocks noGrp="1"/>
+          </p:cNvSpPr>
+          <p:nvPr>
+            <p:ph type="title"/>
+          </p:nvPr>
+        </p:nvSpPr>
+        <p:spPr/>
+        <p:txBody>
+          <a:bodyPr/>
+          <a:lstStyle/>
+          <a:p>
+            <a:r>
+              <a:rPr lang="en-US" dirty="0"/>
+              <a:t>Collections: Sets</a:t>
+            </a:r>
+          </a:p>
+        </p:txBody>
+      </p:sp>
+      <p:sp>
+        <p:nvSpPr>
+          <p:cNvPr id="3" name="Content Placeholder 2">
+            <a:extLst>
+              <a:ext uri="{FF2B5EF4-FFF2-40B4-BE49-F238E27FC236}">
+                <a16:creationId xmlns:a16="http://schemas.microsoft.com/office/drawing/2014/main" id="{651646C9-19AD-44E9-B7A6-0AEBCC4C9A25}"/>
+              </a:ext>
+            </a:extLst>
+          </p:cNvPr>
+          <p:cNvSpPr>
+            <a:spLocks noGrp="1"/>
+          </p:cNvSpPr>
+          <p:nvPr>
+            <p:ph sz="half" idx="1"/>
+          </p:nvPr>
+        </p:nvSpPr>
+        <p:spPr/>
+        <p:txBody>
+          <a:bodyPr>
+            <a:normAutofit lnSpcReduction="10000"/>
+          </a:bodyPr>
+          <a:lstStyle/>
+          <a:p>
+            <a:r>
+              <a:rPr lang="en-US" dirty="0"/>
+              <a:t>Common operations</a:t>
+            </a:r>
+          </a:p>
+          <a:p>
+            <a:endParaRPr lang="en-US" dirty="0"/>
+          </a:p>
+          <a:p>
+            <a:endParaRPr lang="en-US" dirty="0"/>
+          </a:p>
+          <a:p>
+            <a:endParaRPr lang="en-US" dirty="0"/>
+          </a:p>
+          <a:p>
+            <a:endParaRPr lang="en-US" dirty="0"/>
+          </a:p>
+          <a:p>
+            <a:endParaRPr lang="en-US" dirty="0"/>
+          </a:p>
+          <a:p>
+            <a:endParaRPr lang="en-US" dirty="0"/>
+          </a:p>
+          <a:p>
+            <a:r>
+              <a:rPr lang="en-US" dirty="0"/>
+              <a:t>Loop over them like lists</a:t>
+            </a:r>
+          </a:p>
+        </p:txBody>
+      </p:sp>
+      <p:sp>
+        <p:nvSpPr>
+          <p:cNvPr id="4" name="Content Placeholder 3">
+            <a:extLst>
+              <a:ext uri="{FF2B5EF4-FFF2-40B4-BE49-F238E27FC236}">
+                <a16:creationId xmlns:a16="http://schemas.microsoft.com/office/drawing/2014/main" id="{4467F8CA-02EC-4A7A-8AA0-59FAF6D90FC5}"/>
+              </a:ext>
+            </a:extLst>
+          </p:cNvPr>
+          <p:cNvSpPr>
+            <a:spLocks noGrp="1"/>
+          </p:cNvSpPr>
+          <p:nvPr>
+            <p:ph sz="half" idx="2"/>
+          </p:nvPr>
+        </p:nvSpPr>
+        <p:spPr/>
+        <p:txBody>
+          <a:bodyPr>
+            <a:normAutofit lnSpcReduction="10000"/>
+          </a:bodyPr>
+          <a:lstStyle/>
+          <a:p>
+            <a:endParaRPr lang="en-US"/>
+          </a:p>
+        </p:txBody>
+      </p:sp>
+      <p:pic>
+        <p:nvPicPr>
+          <p:cNvPr id="6" name="Picture 5">
+            <a:extLst>
+              <a:ext uri="{FF2B5EF4-FFF2-40B4-BE49-F238E27FC236}">
+                <a16:creationId xmlns:a16="http://schemas.microsoft.com/office/drawing/2014/main" id="{D001EC5D-2485-4C6E-9476-AD47361C658B}"/>
+              </a:ext>
+            </a:extLst>
+          </p:cNvPr>
+          <p:cNvPicPr>
+            <a:picLocks noChangeAspect="1"/>
+          </p:cNvPicPr>
           <p:nvPr/>
-        </p:nvSpPr>
-        <p:spPr>
-          <a:xfrm>
-            <a:off x="680321" y="2481943"/>
-            <a:ext cx="4218250" cy="3416320"/>
+        </p:nvPicPr>
+        <p:blipFill>
+          <a:blip r:embed="rId2"/>
+          <a:stretch>
+            <a:fillRect/>
+          </a:stretch>
+        </p:blipFill>
+        <p:spPr>
+          <a:xfrm>
+            <a:off x="3806057" y="2236330"/>
+            <a:ext cx="8276190" cy="3057143"/>
           </a:xfrm>
           <a:prstGeom prst="rect">
             <a:avLst/>
           </a:prstGeom>
-          <a:noFill/>
-        </p:spPr>
-        <p:txBody>
-          <a:bodyPr wrap="square" rtlCol="0">
-            <a:spAutoFit/>
-          </a:bodyPr>
-          <a:lstStyle/>
-          <a:p>
-            <a:r>
-              <a:rPr lang="en-US" dirty="0"/>
-              <a:t>Continue: stop executing this iteration, go to the next one </a:t>
-            </a:r>
-            <a:r>
-              <a:rPr lang="en-US" dirty="0" err="1"/>
-              <a:t>inmediately</a:t>
-            </a:r>
-            <a:endParaRPr lang="en-US" dirty="0"/>
-          </a:p>
-          <a:p>
-            <a:endParaRPr lang="en-US" dirty="0"/>
-          </a:p>
-          <a:p>
-            <a:endParaRPr lang="en-US" dirty="0"/>
-          </a:p>
-          <a:p>
-            <a:endParaRPr lang="en-US" dirty="0"/>
-          </a:p>
-          <a:p>
-            <a:endParaRPr lang="en-US" dirty="0"/>
-          </a:p>
-          <a:p>
-            <a:r>
-              <a:rPr lang="en-US" dirty="0"/>
-              <a:t>Break: stop looping</a:t>
-            </a:r>
-          </a:p>
-          <a:p>
-            <a:endParaRPr lang="en-US" dirty="0"/>
-          </a:p>
-          <a:p>
-            <a:endParaRPr lang="en-US" dirty="0"/>
-          </a:p>
-          <a:p>
-            <a:r>
-              <a:rPr lang="en-US" dirty="0"/>
-              <a:t>Other control flow: while and do while.</a:t>
-            </a:r>
-          </a:p>
-        </p:txBody>
-      </p:sp>
+        </p:spPr>
+      </p:pic>
     </p:spTree>
     <p:extLst>
       <p:ext uri="{BB962C8B-B14F-4D97-AF65-F5344CB8AC3E}">
-        <p14:creationId xmlns:p14="http://schemas.microsoft.com/office/powerpoint/2010/main" val="3870239290"/>
+        <p14:creationId xmlns:p14="http://schemas.microsoft.com/office/powerpoint/2010/main" val="2670757582"/>
       </p:ext>
     </p:extLst>
   </p:cSld>
@@ -9620,6 +9801,654 @@
     <p:extLst>
       <p:ext uri="{BB962C8B-B14F-4D97-AF65-F5344CB8AC3E}">
         <p14:creationId xmlns:p14="http://schemas.microsoft.com/office/powerpoint/2010/main" val="2877376381"/>
+      </p:ext>
+    </p:extLst>
+  </p:cSld>
+  <p:clrMapOvr>
+    <a:masterClrMapping/>
+  </p:clrMapOvr>
+</p:sld>
+</file>
+
+<file path=ppt/slides/slide20.xml><?xml version="1.0" encoding="utf-8"?>
+<p:sld xmlns:a="http://schemas.openxmlformats.org/drawingml/2006/main" xmlns:r="http://schemas.openxmlformats.org/officeDocument/2006/relationships" xmlns:p="http://schemas.openxmlformats.org/presentationml/2006/main">
+  <p:cSld>
+    <p:spTree>
+      <p:nvGrpSpPr>
+        <p:cNvPr id="1" name=""/>
+        <p:cNvGrpSpPr/>
+        <p:nvPr/>
+      </p:nvGrpSpPr>
+      <p:grpSpPr>
+        <a:xfrm>
+          <a:off x="0" y="0"/>
+          <a:ext cx="0" cy="0"/>
+          <a:chOff x="0" y="0"/>
+          <a:chExt cx="0" cy="0"/>
+        </a:xfrm>
+      </p:grpSpPr>
+      <p:sp>
+        <p:nvSpPr>
+          <p:cNvPr id="2" name="Title 1">
+            <a:extLst>
+              <a:ext uri="{FF2B5EF4-FFF2-40B4-BE49-F238E27FC236}">
+                <a16:creationId xmlns:a16="http://schemas.microsoft.com/office/drawing/2014/main" id="{E1F183CE-CAC3-4B5A-ABF6-9CDDB697CBAE}"/>
+              </a:ext>
+            </a:extLst>
+          </p:cNvPr>
+          <p:cNvSpPr>
+            <a:spLocks noGrp="1"/>
+          </p:cNvSpPr>
+          <p:nvPr>
+            <p:ph type="title"/>
+          </p:nvPr>
+        </p:nvSpPr>
+        <p:spPr/>
+        <p:txBody>
+          <a:bodyPr/>
+          <a:lstStyle/>
+          <a:p>
+            <a:r>
+              <a:rPr lang="en-US" dirty="0"/>
+              <a:t>Collections: Map</a:t>
+            </a:r>
+          </a:p>
+        </p:txBody>
+      </p:sp>
+      <p:sp>
+        <p:nvSpPr>
+          <p:cNvPr id="3" name="Content Placeholder 2">
+            <a:extLst>
+              <a:ext uri="{FF2B5EF4-FFF2-40B4-BE49-F238E27FC236}">
+                <a16:creationId xmlns:a16="http://schemas.microsoft.com/office/drawing/2014/main" id="{BD6AF06C-CAD1-44C2-801F-BBC940CF3C3F}"/>
+              </a:ext>
+            </a:extLst>
+          </p:cNvPr>
+          <p:cNvSpPr>
+            <a:spLocks noGrp="1"/>
+          </p:cNvSpPr>
+          <p:nvPr>
+            <p:ph sz="half" idx="1"/>
+          </p:nvPr>
+        </p:nvSpPr>
+        <p:spPr/>
+        <p:txBody>
+          <a:bodyPr/>
+          <a:lstStyle/>
+          <a:p>
+            <a:r>
+              <a:rPr lang="en-US" dirty="0"/>
+              <a:t>Common operations</a:t>
+            </a:r>
+          </a:p>
+        </p:txBody>
+      </p:sp>
+      <p:pic>
+        <p:nvPicPr>
+          <p:cNvPr id="6" name="Picture 5">
+            <a:extLst>
+              <a:ext uri="{FF2B5EF4-FFF2-40B4-BE49-F238E27FC236}">
+                <a16:creationId xmlns:a16="http://schemas.microsoft.com/office/drawing/2014/main" id="{8C6AF24B-D106-4E40-ADAD-32D4B08A9675}"/>
+              </a:ext>
+            </a:extLst>
+          </p:cNvPr>
+          <p:cNvPicPr>
+            <a:picLocks noChangeAspect="1"/>
+          </p:cNvPicPr>
+          <p:nvPr/>
+        </p:nvPicPr>
+        <p:blipFill>
+          <a:blip r:embed="rId2"/>
+          <a:stretch>
+            <a:fillRect/>
+          </a:stretch>
+        </p:blipFill>
+        <p:spPr>
+          <a:xfrm>
+            <a:off x="4430095" y="2336873"/>
+            <a:ext cx="7761905" cy="3495238"/>
+          </a:xfrm>
+          <a:prstGeom prst="rect">
+            <a:avLst/>
+          </a:prstGeom>
+        </p:spPr>
+      </p:pic>
+    </p:spTree>
+    <p:extLst>
+      <p:ext uri="{BB962C8B-B14F-4D97-AF65-F5344CB8AC3E}">
+        <p14:creationId xmlns:p14="http://schemas.microsoft.com/office/powerpoint/2010/main" val="3015294217"/>
+      </p:ext>
+    </p:extLst>
+  </p:cSld>
+  <p:clrMapOvr>
+    <a:masterClrMapping/>
+  </p:clrMapOvr>
+</p:sld>
+</file>
+
+<file path=ppt/slides/slide21.xml><?xml version="1.0" encoding="utf-8"?>
+<p:sld xmlns:a="http://schemas.openxmlformats.org/drawingml/2006/main" xmlns:r="http://schemas.openxmlformats.org/officeDocument/2006/relationships" xmlns:p="http://schemas.openxmlformats.org/presentationml/2006/main">
+  <p:cSld>
+    <p:spTree>
+      <p:nvGrpSpPr>
+        <p:cNvPr id="1" name=""/>
+        <p:cNvGrpSpPr/>
+        <p:nvPr/>
+      </p:nvGrpSpPr>
+      <p:grpSpPr>
+        <a:xfrm>
+          <a:off x="0" y="0"/>
+          <a:ext cx="0" cy="0"/>
+          <a:chOff x="0" y="0"/>
+          <a:chExt cx="0" cy="0"/>
+        </a:xfrm>
+      </p:grpSpPr>
+      <p:sp>
+        <p:nvSpPr>
+          <p:cNvPr id="2" name="Title 1">
+            <a:extLst>
+              <a:ext uri="{FF2B5EF4-FFF2-40B4-BE49-F238E27FC236}">
+                <a16:creationId xmlns:a16="http://schemas.microsoft.com/office/drawing/2014/main" id="{52D66434-1471-4775-B83D-AEB6FE11936E}"/>
+              </a:ext>
+            </a:extLst>
+          </p:cNvPr>
+          <p:cNvSpPr>
+            <a:spLocks noGrp="1"/>
+          </p:cNvSpPr>
+          <p:nvPr>
+            <p:ph type="title"/>
+          </p:nvPr>
+        </p:nvSpPr>
+        <p:spPr/>
+        <p:txBody>
+          <a:bodyPr/>
+          <a:lstStyle/>
+          <a:p>
+            <a:r>
+              <a:rPr lang="en-US" dirty="0"/>
+              <a:t>Control flow: if/else if/else, switch</a:t>
+            </a:r>
+          </a:p>
+        </p:txBody>
+      </p:sp>
+      <p:sp>
+        <p:nvSpPr>
+          <p:cNvPr id="4" name="Content Placeholder 3">
+            <a:extLst>
+              <a:ext uri="{FF2B5EF4-FFF2-40B4-BE49-F238E27FC236}">
+                <a16:creationId xmlns:a16="http://schemas.microsoft.com/office/drawing/2014/main" id="{3FCB5667-22AC-47A9-8185-C6383F48D485}"/>
+              </a:ext>
+            </a:extLst>
+          </p:cNvPr>
+          <p:cNvSpPr>
+            <a:spLocks noGrp="1"/>
+          </p:cNvSpPr>
+          <p:nvPr>
+            <p:ph sz="half" idx="2"/>
+          </p:nvPr>
+        </p:nvSpPr>
+        <p:spPr/>
+        <p:txBody>
+          <a:bodyPr/>
+          <a:lstStyle/>
+          <a:p>
+            <a:endParaRPr lang="en-US"/>
+          </a:p>
+        </p:txBody>
+      </p:sp>
+      <p:sp>
+        <p:nvSpPr>
+          <p:cNvPr id="11" name="TextBox 10">
+            <a:extLst>
+              <a:ext uri="{FF2B5EF4-FFF2-40B4-BE49-F238E27FC236}">
+                <a16:creationId xmlns:a16="http://schemas.microsoft.com/office/drawing/2014/main" id="{566A6A39-4690-4B3A-A6B1-DA8FAC1623A7}"/>
+              </a:ext>
+            </a:extLst>
+          </p:cNvPr>
+          <p:cNvSpPr txBox="1"/>
+          <p:nvPr/>
+        </p:nvSpPr>
+        <p:spPr>
+          <a:xfrm>
+            <a:off x="680320" y="5131836"/>
+            <a:ext cx="3881534" cy="369332"/>
+          </a:xfrm>
+          <a:prstGeom prst="rect">
+            <a:avLst/>
+          </a:prstGeom>
+          <a:noFill/>
+        </p:spPr>
+        <p:txBody>
+          <a:bodyPr wrap="square" rtlCol="0">
+            <a:spAutoFit/>
+          </a:bodyPr>
+          <a:lstStyle/>
+          <a:p>
+            <a:r>
+              <a:rPr lang="en-US" dirty="0"/>
+              <a:t>Pretty much identical</a:t>
+            </a:r>
+          </a:p>
+        </p:txBody>
+      </p:sp>
+      <p:pic>
+        <p:nvPicPr>
+          <p:cNvPr id="15" name="Picture 14">
+            <a:extLst>
+              <a:ext uri="{FF2B5EF4-FFF2-40B4-BE49-F238E27FC236}">
+                <a16:creationId xmlns:a16="http://schemas.microsoft.com/office/drawing/2014/main" id="{F182A34A-CEF0-4D7A-A51E-13731177685B}"/>
+              </a:ext>
+            </a:extLst>
+          </p:cNvPr>
+          <p:cNvPicPr>
+            <a:picLocks noChangeAspect="1"/>
+          </p:cNvPicPr>
+          <p:nvPr/>
+        </p:nvPicPr>
+        <p:blipFill>
+          <a:blip r:embed="rId2"/>
+          <a:stretch>
+            <a:fillRect/>
+          </a:stretch>
+        </p:blipFill>
+        <p:spPr>
+          <a:xfrm>
+            <a:off x="0" y="1976235"/>
+            <a:ext cx="6916115" cy="2905530"/>
+          </a:xfrm>
+          <a:prstGeom prst="rect">
+            <a:avLst/>
+          </a:prstGeom>
+        </p:spPr>
+      </p:pic>
+      <p:pic>
+        <p:nvPicPr>
+          <p:cNvPr id="17" name="Picture 16">
+            <a:extLst>
+              <a:ext uri="{FF2B5EF4-FFF2-40B4-BE49-F238E27FC236}">
+                <a16:creationId xmlns:a16="http://schemas.microsoft.com/office/drawing/2014/main" id="{2598C180-AA11-4C1D-A599-A7E9DCF614E0}"/>
+              </a:ext>
+            </a:extLst>
+          </p:cNvPr>
+          <p:cNvPicPr>
+            <a:picLocks noChangeAspect="1"/>
+          </p:cNvPicPr>
+          <p:nvPr/>
+        </p:nvPicPr>
+        <p:blipFill>
+          <a:blip r:embed="rId3"/>
+          <a:stretch>
+            <a:fillRect/>
+          </a:stretch>
+        </p:blipFill>
+        <p:spPr>
+          <a:xfrm>
+            <a:off x="7088724" y="1976235"/>
+            <a:ext cx="5103276" cy="4881765"/>
+          </a:xfrm>
+          <a:prstGeom prst="rect">
+            <a:avLst/>
+          </a:prstGeom>
+        </p:spPr>
+      </p:pic>
+    </p:spTree>
+    <p:extLst>
+      <p:ext uri="{BB962C8B-B14F-4D97-AF65-F5344CB8AC3E}">
+        <p14:creationId xmlns:p14="http://schemas.microsoft.com/office/powerpoint/2010/main" val="2492827843"/>
+      </p:ext>
+    </p:extLst>
+  </p:cSld>
+  <p:clrMapOvr>
+    <a:masterClrMapping/>
+  </p:clrMapOvr>
+</p:sld>
+</file>
+
+<file path=ppt/slides/slide22.xml><?xml version="1.0" encoding="utf-8"?>
+<p:sld xmlns:a="http://schemas.openxmlformats.org/drawingml/2006/main" xmlns:r="http://schemas.openxmlformats.org/officeDocument/2006/relationships" xmlns:p="http://schemas.openxmlformats.org/presentationml/2006/main">
+  <p:cSld>
+    <p:spTree>
+      <p:nvGrpSpPr>
+        <p:cNvPr id="1" name=""/>
+        <p:cNvGrpSpPr/>
+        <p:nvPr/>
+      </p:nvGrpSpPr>
+      <p:grpSpPr>
+        <a:xfrm>
+          <a:off x="0" y="0"/>
+          <a:ext cx="0" cy="0"/>
+          <a:chOff x="0" y="0"/>
+          <a:chExt cx="0" cy="0"/>
+        </a:xfrm>
+      </p:grpSpPr>
+      <p:sp>
+        <p:nvSpPr>
+          <p:cNvPr id="2" name="Title 1">
+            <a:extLst>
+              <a:ext uri="{FF2B5EF4-FFF2-40B4-BE49-F238E27FC236}">
+                <a16:creationId xmlns:a16="http://schemas.microsoft.com/office/drawing/2014/main" id="{98A23850-E6EB-4B26-8529-54DF737B18D5}"/>
+              </a:ext>
+            </a:extLst>
+          </p:cNvPr>
+          <p:cNvSpPr>
+            <a:spLocks noGrp="1"/>
+          </p:cNvSpPr>
+          <p:nvPr>
+            <p:ph type="title"/>
+          </p:nvPr>
+        </p:nvSpPr>
+        <p:spPr/>
+        <p:txBody>
+          <a:bodyPr/>
+          <a:lstStyle/>
+          <a:p>
+            <a:r>
+              <a:rPr lang="en-US" dirty="0"/>
+              <a:t>Control flow: for loops</a:t>
+            </a:r>
+          </a:p>
+        </p:txBody>
+      </p:sp>
+      <p:sp>
+        <p:nvSpPr>
+          <p:cNvPr id="3" name="Content Placeholder 2">
+            <a:extLst>
+              <a:ext uri="{FF2B5EF4-FFF2-40B4-BE49-F238E27FC236}">
+                <a16:creationId xmlns:a16="http://schemas.microsoft.com/office/drawing/2014/main" id="{8A758808-704D-4107-868A-B122E3109F2C}"/>
+              </a:ext>
+            </a:extLst>
+          </p:cNvPr>
+          <p:cNvSpPr>
+            <a:spLocks noGrp="1"/>
+          </p:cNvSpPr>
+          <p:nvPr>
+            <p:ph sz="half" idx="1"/>
+          </p:nvPr>
+        </p:nvSpPr>
+        <p:spPr>
+          <a:xfrm>
+            <a:off x="680320" y="2336872"/>
+            <a:ext cx="4698358" cy="4455814"/>
+          </a:xfrm>
+        </p:spPr>
+        <p:txBody>
+          <a:bodyPr>
+            <a:normAutofit lnSpcReduction="10000"/>
+          </a:bodyPr>
+          <a:lstStyle/>
+          <a:p>
+            <a:r>
+              <a:rPr lang="en-US" dirty="0"/>
+              <a:t>Short method</a:t>
+            </a:r>
+          </a:p>
+          <a:p>
+            <a:endParaRPr lang="en-US" dirty="0"/>
+          </a:p>
+          <a:p>
+            <a:endParaRPr lang="en-US" dirty="0"/>
+          </a:p>
+          <a:p>
+            <a:r>
+              <a:rPr lang="en-US" dirty="0"/>
+              <a:t>Longer method</a:t>
+            </a:r>
+          </a:p>
+          <a:p>
+            <a:endParaRPr lang="en-US" dirty="0"/>
+          </a:p>
+          <a:p>
+            <a:endParaRPr lang="en-US" dirty="0"/>
+          </a:p>
+          <a:p>
+            <a:r>
+              <a:rPr lang="en-US" dirty="0" err="1"/>
+              <a:t>forEach</a:t>
+            </a:r>
+            <a:endParaRPr lang="en-US" dirty="0"/>
+          </a:p>
+          <a:p>
+            <a:endParaRPr lang="en-US" dirty="0"/>
+          </a:p>
+          <a:p>
+            <a:endParaRPr lang="en-US" dirty="0"/>
+          </a:p>
+          <a:p>
+            <a:r>
+              <a:rPr lang="en-US" dirty="0" err="1"/>
+              <a:t>forEach</a:t>
+            </a:r>
+            <a:r>
+              <a:rPr lang="en-US" dirty="0"/>
+              <a:t> </a:t>
+            </a:r>
+            <a:r>
+              <a:rPr lang="en-US" dirty="0" err="1"/>
+              <a:t>oneliner</a:t>
+            </a:r>
+            <a:endParaRPr lang="en-US" dirty="0"/>
+          </a:p>
+        </p:txBody>
+      </p:sp>
+      <p:sp>
+        <p:nvSpPr>
+          <p:cNvPr id="4" name="Content Placeholder 3">
+            <a:extLst>
+              <a:ext uri="{FF2B5EF4-FFF2-40B4-BE49-F238E27FC236}">
+                <a16:creationId xmlns:a16="http://schemas.microsoft.com/office/drawing/2014/main" id="{14D767FE-1667-4BE6-8AE7-F84C8C45F384}"/>
+              </a:ext>
+            </a:extLst>
+          </p:cNvPr>
+          <p:cNvSpPr>
+            <a:spLocks noGrp="1"/>
+          </p:cNvSpPr>
+          <p:nvPr>
+            <p:ph sz="half" idx="2"/>
+          </p:nvPr>
+        </p:nvSpPr>
+        <p:spPr/>
+        <p:txBody>
+          <a:bodyPr>
+            <a:normAutofit lnSpcReduction="10000"/>
+          </a:bodyPr>
+          <a:lstStyle/>
+          <a:p>
+            <a:endParaRPr lang="en-US"/>
+          </a:p>
+        </p:txBody>
+      </p:sp>
+      <p:pic>
+        <p:nvPicPr>
+          <p:cNvPr id="6" name="Picture 5">
+            <a:extLst>
+              <a:ext uri="{FF2B5EF4-FFF2-40B4-BE49-F238E27FC236}">
+                <a16:creationId xmlns:a16="http://schemas.microsoft.com/office/drawing/2014/main" id="{BF5F5EDF-B748-4DC2-B3F2-62DFA00BCD3A}"/>
+              </a:ext>
+            </a:extLst>
+          </p:cNvPr>
+          <p:cNvPicPr>
+            <a:picLocks noChangeAspect="1"/>
+          </p:cNvPicPr>
+          <p:nvPr/>
+        </p:nvPicPr>
+        <p:blipFill>
+          <a:blip r:embed="rId2"/>
+          <a:stretch>
+            <a:fillRect/>
+          </a:stretch>
+        </p:blipFill>
+        <p:spPr>
+          <a:xfrm>
+            <a:off x="5192000" y="2010381"/>
+            <a:ext cx="7000000" cy="4847619"/>
+          </a:xfrm>
+          <a:prstGeom prst="rect">
+            <a:avLst/>
+          </a:prstGeom>
+        </p:spPr>
+      </p:pic>
+    </p:spTree>
+    <p:extLst>
+      <p:ext uri="{BB962C8B-B14F-4D97-AF65-F5344CB8AC3E}">
+        <p14:creationId xmlns:p14="http://schemas.microsoft.com/office/powerpoint/2010/main" val="231782438"/>
+      </p:ext>
+    </p:extLst>
+  </p:cSld>
+  <p:clrMapOvr>
+    <a:masterClrMapping/>
+  </p:clrMapOvr>
+</p:sld>
+</file>
+
+<file path=ppt/slides/slide23.xml><?xml version="1.0" encoding="utf-8"?>
+<p:sld xmlns:a="http://schemas.openxmlformats.org/drawingml/2006/main" xmlns:r="http://schemas.openxmlformats.org/officeDocument/2006/relationships" xmlns:p="http://schemas.openxmlformats.org/presentationml/2006/main">
+  <p:cSld>
+    <p:spTree>
+      <p:nvGrpSpPr>
+        <p:cNvPr id="1" name=""/>
+        <p:cNvGrpSpPr/>
+        <p:nvPr/>
+      </p:nvGrpSpPr>
+      <p:grpSpPr>
+        <a:xfrm>
+          <a:off x="0" y="0"/>
+          <a:ext cx="0" cy="0"/>
+          <a:chOff x="0" y="0"/>
+          <a:chExt cx="0" cy="0"/>
+        </a:xfrm>
+      </p:grpSpPr>
+      <p:sp>
+        <p:nvSpPr>
+          <p:cNvPr id="2" name="Title 1">
+            <a:extLst>
+              <a:ext uri="{FF2B5EF4-FFF2-40B4-BE49-F238E27FC236}">
+                <a16:creationId xmlns:a16="http://schemas.microsoft.com/office/drawing/2014/main" id="{B9CE91F1-0C04-4DB5-9295-6E468DE1FBDA}"/>
+              </a:ext>
+            </a:extLst>
+          </p:cNvPr>
+          <p:cNvSpPr>
+            <a:spLocks noGrp="1"/>
+          </p:cNvSpPr>
+          <p:nvPr>
+            <p:ph type="title"/>
+          </p:nvPr>
+        </p:nvSpPr>
+        <p:spPr/>
+        <p:txBody>
+          <a:bodyPr/>
+          <a:lstStyle/>
+          <a:p>
+            <a:r>
+              <a:rPr lang="en-US" dirty="0"/>
+              <a:t>Control flow: continue and break</a:t>
+            </a:r>
+          </a:p>
+        </p:txBody>
+      </p:sp>
+      <p:pic>
+        <p:nvPicPr>
+          <p:cNvPr id="10" name="Picture 9">
+            <a:extLst>
+              <a:ext uri="{FF2B5EF4-FFF2-40B4-BE49-F238E27FC236}">
+                <a16:creationId xmlns:a16="http://schemas.microsoft.com/office/drawing/2014/main" id="{3CF32824-DAEF-4E54-902D-56C528060128}"/>
+              </a:ext>
+            </a:extLst>
+          </p:cNvPr>
+          <p:cNvPicPr>
+            <a:picLocks noChangeAspect="1"/>
+          </p:cNvPicPr>
+          <p:nvPr/>
+        </p:nvPicPr>
+        <p:blipFill>
+          <a:blip r:embed="rId2"/>
+          <a:stretch>
+            <a:fillRect/>
+          </a:stretch>
+        </p:blipFill>
+        <p:spPr>
+          <a:xfrm>
+            <a:off x="5801524" y="1969277"/>
+            <a:ext cx="6390476" cy="3628571"/>
+          </a:xfrm>
+          <a:prstGeom prst="rect">
+            <a:avLst/>
+          </a:prstGeom>
+        </p:spPr>
+      </p:pic>
+      <p:sp>
+        <p:nvSpPr>
+          <p:cNvPr id="11" name="TextBox 10">
+            <a:extLst>
+              <a:ext uri="{FF2B5EF4-FFF2-40B4-BE49-F238E27FC236}">
+                <a16:creationId xmlns:a16="http://schemas.microsoft.com/office/drawing/2014/main" id="{BC524871-525B-4095-B9C4-61FB1196B99D}"/>
+              </a:ext>
+            </a:extLst>
+          </p:cNvPr>
+          <p:cNvSpPr txBox="1"/>
+          <p:nvPr/>
+        </p:nvSpPr>
+        <p:spPr>
+          <a:xfrm>
+            <a:off x="680321" y="2481943"/>
+            <a:ext cx="4218250" cy="3416320"/>
+          </a:xfrm>
+          <a:prstGeom prst="rect">
+            <a:avLst/>
+          </a:prstGeom>
+          <a:noFill/>
+        </p:spPr>
+        <p:txBody>
+          <a:bodyPr wrap="square" rtlCol="0">
+            <a:spAutoFit/>
+          </a:bodyPr>
+          <a:lstStyle/>
+          <a:p>
+            <a:r>
+              <a:rPr lang="en-US" dirty="0"/>
+              <a:t>Continue: stop executing this iteration, go to the next one </a:t>
+            </a:r>
+            <a:r>
+              <a:rPr lang="en-US" dirty="0" err="1"/>
+              <a:t>inmediately</a:t>
+            </a:r>
+            <a:endParaRPr lang="en-US" dirty="0"/>
+          </a:p>
+          <a:p>
+            <a:endParaRPr lang="en-US" dirty="0"/>
+          </a:p>
+          <a:p>
+            <a:endParaRPr lang="en-US" dirty="0"/>
+          </a:p>
+          <a:p>
+            <a:endParaRPr lang="en-US" dirty="0"/>
+          </a:p>
+          <a:p>
+            <a:endParaRPr lang="en-US" dirty="0"/>
+          </a:p>
+          <a:p>
+            <a:r>
+              <a:rPr lang="en-US" dirty="0"/>
+              <a:t>Break: stop looping</a:t>
+            </a:r>
+          </a:p>
+          <a:p>
+            <a:endParaRPr lang="en-US" dirty="0"/>
+          </a:p>
+          <a:p>
+            <a:endParaRPr lang="en-US" dirty="0"/>
+          </a:p>
+          <a:p>
+            <a:r>
+              <a:rPr lang="en-US" dirty="0"/>
+              <a:t>Other control flow: while and do while.</a:t>
+            </a:r>
+          </a:p>
+        </p:txBody>
+      </p:sp>
+    </p:spTree>
+    <p:extLst>
+      <p:ext uri="{BB962C8B-B14F-4D97-AF65-F5344CB8AC3E}">
+        <p14:creationId xmlns:p14="http://schemas.microsoft.com/office/powerpoint/2010/main" val="3870239290"/>
       </p:ext>
     </p:extLst>
   </p:cSld>

</xml_diff>

<commit_message>
changed markdown, fixed an issue in slides
</commit_message>
<xml_diff>
--- a/week2/week2_slideshow.pptx
+++ b/week2/week2_slideshow.pptx
@@ -37,6 +37,7 @@
     <p:sldId id="284" r:id="rId31"/>
     <p:sldId id="285" r:id="rId32"/>
     <p:sldId id="286" r:id="rId33"/>
+    <p:sldId id="288" r:id="rId34"/>
   </p:sldIdLst>
   <p:sldSz cx="12192000" cy="6858000"/>
   <p:notesSz cx="6858000" cy="9144000"/>
@@ -417,7 +418,7 @@
           <a:p>
             <a:fld id="{34891F7B-7391-4F87-9AA4-1E9AC2164F40}" type="datetimeFigureOut">
               <a:rPr lang="en-US" smtClean="0"/>
-              <a:t>08-Nov-21</a:t>
+              <a:t>10-Nov-21</a:t>
             </a:fld>
             <a:endParaRPr lang="en-US"/>
           </a:p>
@@ -831,7 +832,7 @@
           <a:p>
             <a:fld id="{34891F7B-7391-4F87-9AA4-1E9AC2164F40}" type="datetimeFigureOut">
               <a:rPr lang="en-US" smtClean="0"/>
-              <a:t>08-Nov-21</a:t>
+              <a:t>10-Nov-21</a:t>
             </a:fld>
             <a:endParaRPr lang="en-US"/>
           </a:p>
@@ -1167,7 +1168,7 @@
           <a:p>
             <a:fld id="{34891F7B-7391-4F87-9AA4-1E9AC2164F40}" type="datetimeFigureOut">
               <a:rPr lang="en-US" smtClean="0"/>
-              <a:t>08-Nov-21</a:t>
+              <a:t>10-Nov-21</a:t>
             </a:fld>
             <a:endParaRPr lang="en-US"/>
           </a:p>
@@ -1572,7 +1573,7 @@
           <a:p>
             <a:fld id="{34891F7B-7391-4F87-9AA4-1E9AC2164F40}" type="datetimeFigureOut">
               <a:rPr lang="en-US" smtClean="0"/>
-              <a:t>08-Nov-21</a:t>
+              <a:t>10-Nov-21</a:t>
             </a:fld>
             <a:endParaRPr lang="en-US"/>
           </a:p>
@@ -2140,7 +2141,7 @@
           <a:p>
             <a:fld id="{34891F7B-7391-4F87-9AA4-1E9AC2164F40}" type="datetimeFigureOut">
               <a:rPr lang="en-US" smtClean="0"/>
-              <a:t>08-Nov-21</a:t>
+              <a:t>10-Nov-21</a:t>
             </a:fld>
             <a:endParaRPr lang="en-US"/>
           </a:p>
@@ -2821,7 +2822,7 @@
           <a:p>
             <a:fld id="{34891F7B-7391-4F87-9AA4-1E9AC2164F40}" type="datetimeFigureOut">
               <a:rPr lang="en-US" smtClean="0"/>
-              <a:t>08-Nov-21</a:t>
+              <a:t>10-Nov-21</a:t>
             </a:fld>
             <a:endParaRPr lang="en-US"/>
           </a:p>
@@ -3734,7 +3735,7 @@
           <a:p>
             <a:fld id="{34891F7B-7391-4F87-9AA4-1E9AC2164F40}" type="datetimeFigureOut">
               <a:rPr lang="en-US" smtClean="0"/>
-              <a:t>08-Nov-21</a:t>
+              <a:t>10-Nov-21</a:t>
             </a:fld>
             <a:endParaRPr lang="en-US"/>
           </a:p>
@@ -4047,7 +4048,7 @@
           <a:p>
             <a:fld id="{34891F7B-7391-4F87-9AA4-1E9AC2164F40}" type="datetimeFigureOut">
               <a:rPr lang="en-US" smtClean="0"/>
-              <a:t>08-Nov-21</a:t>
+              <a:t>10-Nov-21</a:t>
             </a:fld>
             <a:endParaRPr lang="en-US"/>
           </a:p>
@@ -4311,7 +4312,7 @@
           <a:p>
             <a:fld id="{34891F7B-7391-4F87-9AA4-1E9AC2164F40}" type="datetimeFigureOut">
               <a:rPr lang="en-US" smtClean="0"/>
-              <a:t>08-Nov-21</a:t>
+              <a:t>10-Nov-21</a:t>
             </a:fld>
             <a:endParaRPr lang="en-US"/>
           </a:p>
@@ -4660,7 +4661,7 @@
           <a:p>
             <a:fld id="{34891F7B-7391-4F87-9AA4-1E9AC2164F40}" type="datetimeFigureOut">
               <a:rPr lang="en-US" smtClean="0"/>
-              <a:t>08-Nov-21</a:t>
+              <a:t>10-Nov-21</a:t>
             </a:fld>
             <a:endParaRPr lang="en-US"/>
           </a:p>
@@ -4974,7 +4975,7 @@
           <a:p>
             <a:fld id="{34891F7B-7391-4F87-9AA4-1E9AC2164F40}" type="datetimeFigureOut">
               <a:rPr lang="en-US" smtClean="0"/>
-              <a:t>08-Nov-21</a:t>
+              <a:t>10-Nov-21</a:t>
             </a:fld>
             <a:endParaRPr lang="en-US"/>
           </a:p>
@@ -5283,7 +5284,7 @@
           <a:p>
             <a:fld id="{34891F7B-7391-4F87-9AA4-1E9AC2164F40}" type="datetimeFigureOut">
               <a:rPr lang="en-US" smtClean="0"/>
-              <a:t>08-Nov-21</a:t>
+              <a:t>10-Nov-21</a:t>
             </a:fld>
             <a:endParaRPr lang="en-US"/>
           </a:p>
@@ -5672,7 +5673,7 @@
           <a:p>
             <a:fld id="{34891F7B-7391-4F87-9AA4-1E9AC2164F40}" type="datetimeFigureOut">
               <a:rPr lang="en-US" smtClean="0"/>
-              <a:t>08-Nov-21</a:t>
+              <a:t>10-Nov-21</a:t>
             </a:fld>
             <a:endParaRPr lang="en-US"/>
           </a:p>
@@ -6048,7 +6049,7 @@
           <a:p>
             <a:fld id="{34891F7B-7391-4F87-9AA4-1E9AC2164F40}" type="datetimeFigureOut">
               <a:rPr lang="en-US" smtClean="0"/>
-              <a:t>08-Nov-21</a:t>
+              <a:t>10-Nov-21</a:t>
             </a:fld>
             <a:endParaRPr lang="en-US"/>
           </a:p>
@@ -6554,7 +6555,7 @@
           <a:p>
             <a:fld id="{34891F7B-7391-4F87-9AA4-1E9AC2164F40}" type="datetimeFigureOut">
               <a:rPr lang="en-US" smtClean="0"/>
-              <a:t>08-Nov-21</a:t>
+              <a:t>10-Nov-21</a:t>
             </a:fld>
             <a:endParaRPr lang="en-US"/>
           </a:p>
@@ -6811,7 +6812,7 @@
           <a:p>
             <a:fld id="{34891F7B-7391-4F87-9AA4-1E9AC2164F40}" type="datetimeFigureOut">
               <a:rPr lang="en-US" smtClean="0"/>
-              <a:t>08-Nov-21</a:t>
+              <a:t>10-Nov-21</a:t>
             </a:fld>
             <a:endParaRPr lang="en-US"/>
           </a:p>
@@ -6974,7 +6975,7 @@
           <a:p>
             <a:fld id="{34891F7B-7391-4F87-9AA4-1E9AC2164F40}" type="datetimeFigureOut">
               <a:rPr lang="en-US" smtClean="0"/>
-              <a:t>08-Nov-21</a:t>
+              <a:t>10-Nov-21</a:t>
             </a:fld>
             <a:endParaRPr lang="en-US"/>
           </a:p>
@@ -7364,7 +7365,7 @@
           <a:p>
             <a:fld id="{34891F7B-7391-4F87-9AA4-1E9AC2164F40}" type="datetimeFigureOut">
               <a:rPr lang="en-US" smtClean="0"/>
-              <a:t>08-Nov-21</a:t>
+              <a:t>10-Nov-21</a:t>
             </a:fld>
             <a:endParaRPr lang="en-US"/>
           </a:p>
@@ -7773,7 +7774,7 @@
           <a:p>
             <a:fld id="{34891F7B-7391-4F87-9AA4-1E9AC2164F40}" type="datetimeFigureOut">
               <a:rPr lang="en-US" smtClean="0"/>
-              <a:t>08-Nov-21</a:t>
+              <a:t>10-Nov-21</a:t>
             </a:fld>
             <a:endParaRPr lang="en-US"/>
           </a:p>
@@ -8182,7 +8183,7 @@
           <a:p>
             <a:fld id="{34891F7B-7391-4F87-9AA4-1E9AC2164F40}" type="datetimeFigureOut">
               <a:rPr lang="en-US" smtClean="0"/>
-              <a:t>08-Nov-21</a:t>
+              <a:t>10-Nov-21</a:t>
             </a:fld>
             <a:endParaRPr lang="en-US"/>
           </a:p>
@@ -8518,7 +8519,7 @@
           <a:p>
             <a:fld id="{34891F7B-7391-4F87-9AA4-1E9AC2164F40}" type="datetimeFigureOut">
               <a:rPr lang="en-US" smtClean="0"/>
-              <a:t>08-Nov-21</a:t>
+              <a:t>10-Nov-21</a:t>
             </a:fld>
             <a:endParaRPr lang="en-US"/>
           </a:p>
@@ -8923,7 +8924,7 @@
           <a:p>
             <a:fld id="{34891F7B-7391-4F87-9AA4-1E9AC2164F40}" type="datetimeFigureOut">
               <a:rPr lang="en-US" smtClean="0"/>
-              <a:t>08-Nov-21</a:t>
+              <a:t>10-Nov-21</a:t>
             </a:fld>
             <a:endParaRPr lang="en-US"/>
           </a:p>
@@ -9549,7 +9550,7 @@
           <a:p>
             <a:fld id="{34891F7B-7391-4F87-9AA4-1E9AC2164F40}" type="datetimeFigureOut">
               <a:rPr lang="en-US" smtClean="0"/>
-              <a:t>08-Nov-21</a:t>
+              <a:t>10-Nov-21</a:t>
             </a:fld>
             <a:endParaRPr lang="en-US"/>
           </a:p>
@@ -9885,7 +9886,7 @@
           <a:p>
             <a:fld id="{34891F7B-7391-4F87-9AA4-1E9AC2164F40}" type="datetimeFigureOut">
               <a:rPr lang="en-US" smtClean="0"/>
-              <a:t>08-Nov-21</a:t>
+              <a:t>10-Nov-21</a:t>
             </a:fld>
             <a:endParaRPr lang="en-US"/>
           </a:p>
@@ -10566,7 +10567,7 @@
           <a:p>
             <a:fld id="{34891F7B-7391-4F87-9AA4-1E9AC2164F40}" type="datetimeFigureOut">
               <a:rPr lang="en-US" smtClean="0"/>
-              <a:t>08-Nov-21</a:t>
+              <a:t>10-Nov-21</a:t>
             </a:fld>
             <a:endParaRPr lang="en-US"/>
           </a:p>
@@ -11479,7 +11480,7 @@
           <a:p>
             <a:fld id="{34891F7B-7391-4F87-9AA4-1E9AC2164F40}" type="datetimeFigureOut">
               <a:rPr lang="en-US" smtClean="0"/>
-              <a:t>08-Nov-21</a:t>
+              <a:t>10-Nov-21</a:t>
             </a:fld>
             <a:endParaRPr lang="en-US"/>
           </a:p>
@@ -11792,7 +11793,7 @@
           <a:p>
             <a:fld id="{34891F7B-7391-4F87-9AA4-1E9AC2164F40}" type="datetimeFigureOut">
               <a:rPr lang="en-US" smtClean="0"/>
-              <a:t>08-Nov-21</a:t>
+              <a:t>10-Nov-21</a:t>
             </a:fld>
             <a:endParaRPr lang="en-US"/>
           </a:p>
@@ -12056,7 +12057,7 @@
           <a:p>
             <a:fld id="{34891F7B-7391-4F87-9AA4-1E9AC2164F40}" type="datetimeFigureOut">
               <a:rPr lang="en-US" smtClean="0"/>
-              <a:t>08-Nov-21</a:t>
+              <a:t>10-Nov-21</a:t>
             </a:fld>
             <a:endParaRPr lang="en-US"/>
           </a:p>
@@ -12441,7 +12442,7 @@
           <a:p>
             <a:fld id="{34891F7B-7391-4F87-9AA4-1E9AC2164F40}" type="datetimeFigureOut">
               <a:rPr lang="en-US" smtClean="0"/>
-              <a:t>08-Nov-21</a:t>
+              <a:t>10-Nov-21</a:t>
             </a:fld>
             <a:endParaRPr lang="en-US"/>
           </a:p>
@@ -12947,7 +12948,7 @@
           <a:p>
             <a:fld id="{34891F7B-7391-4F87-9AA4-1E9AC2164F40}" type="datetimeFigureOut">
               <a:rPr lang="en-US" smtClean="0"/>
-              <a:t>08-Nov-21</a:t>
+              <a:t>10-Nov-21</a:t>
             </a:fld>
             <a:endParaRPr lang="en-US"/>
           </a:p>
@@ -13204,7 +13205,7 @@
           <a:p>
             <a:fld id="{34891F7B-7391-4F87-9AA4-1E9AC2164F40}" type="datetimeFigureOut">
               <a:rPr lang="en-US" smtClean="0"/>
-              <a:t>08-Nov-21</a:t>
+              <a:t>10-Nov-21</a:t>
             </a:fld>
             <a:endParaRPr lang="en-US"/>
           </a:p>
@@ -13367,7 +13368,7 @@
           <a:p>
             <a:fld id="{34891F7B-7391-4F87-9AA4-1E9AC2164F40}" type="datetimeFigureOut">
               <a:rPr lang="en-US" smtClean="0"/>
-              <a:t>08-Nov-21</a:t>
+              <a:t>10-Nov-21</a:t>
             </a:fld>
             <a:endParaRPr lang="en-US"/>
           </a:p>
@@ -13757,7 +13758,7 @@
           <a:p>
             <a:fld id="{34891F7B-7391-4F87-9AA4-1E9AC2164F40}" type="datetimeFigureOut">
               <a:rPr lang="en-US" smtClean="0"/>
-              <a:t>08-Nov-21</a:t>
+              <a:t>10-Nov-21</a:t>
             </a:fld>
             <a:endParaRPr lang="en-US"/>
           </a:p>
@@ -14166,7 +14167,7 @@
           <a:p>
             <a:fld id="{34891F7B-7391-4F87-9AA4-1E9AC2164F40}" type="datetimeFigureOut">
               <a:rPr lang="en-US" smtClean="0"/>
-              <a:t>08-Nov-21</a:t>
+              <a:t>10-Nov-21</a:t>
             </a:fld>
             <a:endParaRPr lang="en-US"/>
           </a:p>
@@ -14410,7 +14411,7 @@
           <a:p>
             <a:fld id="{34891F7B-7391-4F87-9AA4-1E9AC2164F40}" type="datetimeFigureOut">
               <a:rPr lang="en-US" smtClean="0"/>
-              <a:t>08-Nov-21</a:t>
+              <a:t>10-Nov-21</a:t>
             </a:fld>
             <a:endParaRPr lang="en-US"/>
           </a:p>
@@ -14987,7 +14988,7 @@
           <a:p>
             <a:fld id="{34891F7B-7391-4F87-9AA4-1E9AC2164F40}" type="datetimeFigureOut">
               <a:rPr lang="en-US" smtClean="0"/>
-              <a:t>08-Nov-21</a:t>
+              <a:t>10-Nov-21</a:t>
             </a:fld>
             <a:endParaRPr lang="en-US"/>
           </a:p>
@@ -15532,29 +15533,13 @@
           <a:p>
             <a:r>
               <a:rPr lang="en-US" dirty="0"/>
-              <a:t>Increment </a:t>
-            </a:r>
-            <a:r>
-              <a:rPr lang="en-US" dirty="0" err="1"/>
-              <a:t>en</a:t>
-            </a:r>
+              <a:t>Increment and decrement</a:t>
+            </a:r>
+          </a:p>
+          <a:p>
             <a:r>
               <a:rPr lang="en-US" dirty="0"/>
-              <a:t> decrement</a:t>
-            </a:r>
-          </a:p>
-          <a:p>
-            <a:r>
-              <a:rPr lang="en-US" dirty="0"/>
-              <a:t>Postfix </a:t>
-            </a:r>
-            <a:r>
-              <a:rPr lang="en-US" dirty="0" err="1"/>
-              <a:t>en</a:t>
-            </a:r>
-            <a:r>
-              <a:rPr lang="en-US" dirty="0"/>
-              <a:t> prefix</a:t>
+              <a:t>Postfix and prefix</a:t>
             </a:r>
           </a:p>
         </p:txBody>
@@ -15676,7 +15661,13 @@
           <a:p>
             <a:r>
               <a:rPr lang="en-US" dirty="0"/>
-              <a:t>Operator precedence </a:t>
+              <a:t>Operator precedence</a:t>
+            </a:r>
+          </a:p>
+          <a:p>
+            <a:r>
+              <a:rPr lang="en-US" dirty="0"/>
+              <a:t>There are bitwise operators if you need them  </a:t>
             </a:r>
           </a:p>
         </p:txBody>
@@ -15733,7 +15724,7 @@
         </p:blipFill>
         <p:spPr>
           <a:xfrm>
-            <a:off x="5804246" y="3292606"/>
+            <a:off x="7365163" y="3257265"/>
             <a:ext cx="3609340" cy="3533140"/>
           </a:xfrm>
           <a:prstGeom prst="rect">
@@ -17823,7 +17814,7 @@
         <p:spPr/>
         <p:txBody>
           <a:bodyPr>
-            <a:normAutofit lnSpcReduction="10000"/>
+            <a:normAutofit/>
           </a:bodyPr>
           <a:lstStyle/>
           <a:p>
@@ -17853,25 +17844,19 @@
           <a:p>
             <a:r>
               <a:rPr lang="en-US" dirty="0"/>
+              <a:t>Collections </a:t>
+            </a:r>
+          </a:p>
+          <a:p>
+            <a:r>
+              <a:rPr lang="en-US" dirty="0"/>
               <a:t>Flow control </a:t>
             </a:r>
           </a:p>
           <a:p>
             <a:r>
               <a:rPr lang="en-US" dirty="0"/>
-              <a:t>Other collections besides string</a:t>
-            </a:r>
-          </a:p>
-          <a:p>
-            <a:r>
-              <a:rPr lang="en-US" dirty="0"/>
-              <a:t>Functions</a:t>
-            </a:r>
-          </a:p>
-          <a:p>
-            <a:r>
-              <a:rPr lang="en-US" dirty="0"/>
-              <a:t>Classes </a:t>
+              <a:t>Functions </a:t>
             </a:r>
           </a:p>
           <a:p>
@@ -18527,20 +18512,20 @@
           <a:p>
             <a:r>
               <a:rPr lang="en-US" sz="1400" dirty="0"/>
+              <a:t>Sets are often used when you want unique items, don’t need ordering, and when you need to check if something exists in a collection</a:t>
+            </a:r>
+          </a:p>
+          <a:p>
+            <a:endParaRPr lang="en-US" sz="1400" dirty="0"/>
+          </a:p>
+          <a:p>
+            <a:endParaRPr lang="en-US" sz="1400" dirty="0"/>
+          </a:p>
+          <a:p>
+            <a:r>
+              <a:rPr lang="en-US" sz="1400" dirty="0"/>
               <a:t>Common operations</a:t>
             </a:r>
-          </a:p>
-          <a:p>
-            <a:endParaRPr lang="en-US" sz="1400" dirty="0"/>
-          </a:p>
-          <a:p>
-            <a:endParaRPr lang="en-US" sz="1400" dirty="0"/>
-          </a:p>
-          <a:p>
-            <a:endParaRPr lang="en-US" sz="1400" dirty="0"/>
-          </a:p>
-          <a:p>
-            <a:endParaRPr lang="en-US" sz="1400" dirty="0"/>
           </a:p>
           <a:p>
             <a:endParaRPr lang="en-US" sz="1400" dirty="0"/>
@@ -18558,10 +18543,10 @@
       </p:sp>
       <p:pic>
         <p:nvPicPr>
-          <p:cNvPr id="6" name="Picture 5">
+          <p:cNvPr id="8" name="Picture 7">
             <a:extLst>
               <a:ext uri="{FF2B5EF4-FFF2-40B4-BE49-F238E27FC236}">
-                <a16:creationId xmlns:a16="http://schemas.microsoft.com/office/drawing/2014/main" id="{D001EC5D-2485-4C6E-9476-AD47361C658B}"/>
+                <a16:creationId xmlns:a16="http://schemas.microsoft.com/office/drawing/2014/main" id="{3DBE5EB6-278F-4F7D-9A94-67B7F906A239}"/>
               </a:ext>
             </a:extLst>
           </p:cNvPr>
@@ -18578,22 +18563,12 @@
         </p:blipFill>
         <p:spPr>
           <a:xfrm>
-            <a:off x="5276090" y="2269146"/>
-            <a:ext cx="6269479" cy="2319707"/>
-          </a:xfrm>
-          <a:prstGeom prst="rect">
-            <a:avLst/>
-          </a:prstGeom>
-          <a:ln>
-            <a:noFill/>
-          </a:ln>
-          <a:effectLst>
-            <a:outerShdw blurRad="76200" dist="63500" dir="5040000" algn="tl" rotWithShape="0">
-              <a:srgbClr val="000000">
-                <a:alpha val="41000"/>
-              </a:srgbClr>
-            </a:outerShdw>
-          </a:effectLst>
+            <a:off x="4487238" y="2300858"/>
+            <a:ext cx="7704762" cy="3038095"/>
+          </a:xfrm>
+          <a:prstGeom prst="rect">
+            <a:avLst/>
+          </a:prstGeom>
         </p:spPr>
       </p:pic>
     </p:spTree>
@@ -18670,10 +18645,24 @@
             <p:ph sz="half" idx="1"/>
           </p:nvPr>
         </p:nvSpPr>
-        <p:spPr/>
+        <p:spPr>
+          <a:xfrm>
+            <a:off x="680320" y="2336873"/>
+            <a:ext cx="3749775" cy="3599316"/>
+          </a:xfrm>
+        </p:spPr>
         <p:txBody>
           <a:bodyPr/>
           <a:lstStyle/>
+          <a:p>
+            <a:r>
+              <a:rPr lang="en-US" dirty="0"/>
+              <a:t>Maps are for associative data, and fast lookups</a:t>
+            </a:r>
+          </a:p>
+          <a:p>
+            <a:endParaRPr lang="en-US" dirty="0"/>
+          </a:p>
           <a:p>
             <a:r>
               <a:rPr lang="en-US" dirty="0"/>
@@ -18704,7 +18693,7 @@
         </p:blipFill>
         <p:spPr>
           <a:xfrm>
-            <a:off x="4047709" y="2388912"/>
+            <a:off x="4430095" y="2336873"/>
             <a:ext cx="7761905" cy="3495238"/>
           </a:xfrm>
           <a:prstGeom prst="rect">
@@ -18927,7 +18916,7 @@
           <a:p>
             <a:r>
               <a:rPr lang="en-US" dirty="0"/>
-              <a:t>Splay trees</a:t>
+              <a:t>Trees </a:t>
             </a:r>
           </a:p>
         </p:txBody>
@@ -19677,7 +19666,7 @@
           <a:lstStyle/>
           <a:p>
             <a:r>
-              <a:rPr lang="en-US" sz="2400"/>
+              <a:rPr lang="en-US" sz="2400" dirty="0"/>
               <a:t>Control flow: for loops</a:t>
             </a:r>
           </a:p>
@@ -19746,13 +19735,13 @@
         </p:nvSpPr>
         <p:spPr>
           <a:xfrm>
-            <a:off x="680321" y="2336872"/>
+            <a:off x="529098" y="2873038"/>
             <a:ext cx="3656289" cy="3911527"/>
           </a:xfrm>
         </p:spPr>
         <p:txBody>
           <a:bodyPr vert="horz" lIns="91440" tIns="45720" rIns="91440" bIns="45720" rtlCol="0">
-            <a:normAutofit fontScale="92500" lnSpcReduction="10000"/>
+            <a:normAutofit/>
           </a:bodyPr>
           <a:lstStyle/>
           <a:p>
@@ -19762,12 +19751,9 @@
             </a:r>
           </a:p>
           <a:p>
-            <a:endParaRPr lang="en-US" sz="1800" dirty="0"/>
-          </a:p>
-          <a:p>
-            <a:endParaRPr lang="en-US" sz="1800" dirty="0"/>
-          </a:p>
-          <a:p>
+            <a:pPr marL="0" indent="0">
+              <a:buNone/>
+            </a:pPr>
             <a:endParaRPr lang="en-US" sz="1800" dirty="0"/>
           </a:p>
           <a:p>
@@ -19817,10 +19803,10 @@
       </p:sp>
       <p:pic>
         <p:nvPicPr>
-          <p:cNvPr id="6" name="Picture 5">
+          <p:cNvPr id="8" name="Picture 7">
             <a:extLst>
               <a:ext uri="{FF2B5EF4-FFF2-40B4-BE49-F238E27FC236}">
-                <a16:creationId xmlns:a16="http://schemas.microsoft.com/office/drawing/2014/main" id="{BF5F5EDF-B748-4DC2-B3F2-62DFA00BCD3A}"/>
+                <a16:creationId xmlns:a16="http://schemas.microsoft.com/office/drawing/2014/main" id="{79F90397-5B92-483C-A075-D5CCA7958CFF}"/>
               </a:ext>
             </a:extLst>
           </p:cNvPr>
@@ -19837,22 +19823,12 @@
         </p:blipFill>
         <p:spPr>
           <a:xfrm>
-            <a:off x="5242200" y="1977798"/>
-            <a:ext cx="6269479" cy="4341613"/>
-          </a:xfrm>
-          <a:prstGeom prst="rect">
-            <a:avLst/>
-          </a:prstGeom>
-          <a:ln>
-            <a:noFill/>
-          </a:ln>
-          <a:effectLst>
-            <a:outerShdw blurRad="76200" dist="63500" dir="5040000" algn="tl" rotWithShape="0">
-              <a:srgbClr val="000000">
-                <a:alpha val="41000"/>
-              </a:srgbClr>
-            </a:outerShdw>
-          </a:effectLst>
+            <a:off x="4369775" y="2165517"/>
+            <a:ext cx="7819048" cy="4619048"/>
+          </a:xfrm>
+          <a:prstGeom prst="rect">
+            <a:avLst/>
+          </a:prstGeom>
         </p:spPr>
       </p:pic>
     </p:spTree>
@@ -19958,7 +19934,7 @@
         <p:spPr>
           <a:xfrm>
             <a:off x="680321" y="2481943"/>
-            <a:ext cx="4218250" cy="3416320"/>
+            <a:ext cx="4218250" cy="3139321"/>
           </a:xfrm>
           <a:prstGeom prst="rect">
             <a:avLst/>
@@ -20008,7 +19984,7 @@
           <a:p>
             <a:r>
               <a:rPr lang="en-US" dirty="0"/>
-              <a:t>Other control flow: while and do while.</a:t>
+              <a:t>Other loops: while and do while.</a:t>
             </a:r>
           </a:p>
         </p:txBody>
@@ -20095,26 +20071,41 @@
         </p:spPr>
         <p:txBody>
           <a:bodyPr>
-            <a:normAutofit fontScale="92500" lnSpcReduction="10000"/>
+            <a:normAutofit fontScale="92500"/>
           </a:bodyPr>
           <a:lstStyle/>
           <a:p>
             <a:r>
               <a:rPr lang="en-US" dirty="0"/>
+              <a:t>All 3 of these are equivalent</a:t>
+            </a:r>
+          </a:p>
+          <a:p>
+            <a:endParaRPr lang="en-US" dirty="0"/>
+          </a:p>
+          <a:p>
+            <a:r>
+              <a:rPr lang="en-US" dirty="0"/>
               <a:t>The standard function declaration</a:t>
             </a:r>
           </a:p>
           <a:p>
+            <a:pPr marL="0" indent="0">
+              <a:buNone/>
+            </a:pPr>
             <a:endParaRPr lang="en-US" dirty="0"/>
           </a:p>
           <a:p>
             <a:r>
-              <a:rPr lang="en-US" dirty="0"/>
-              <a:t>Functions can be assigned to a var, although, if you have to, just use the standard function declaration </a:t>
-            </a:r>
-          </a:p>
-          <a:p>
-            <a:endParaRPr lang="en-US" dirty="0"/>
+              <a:rPr lang="en-US" sz="2200" dirty="0"/>
+              <a:t>Anonymous functions can be assigned to a variable.</a:t>
+            </a:r>
+          </a:p>
+          <a:p>
+            <a:r>
+              <a:rPr lang="en-US" sz="2200" dirty="0"/>
+              <a:t>Although, if you must do that, just use the standard function declaration </a:t>
+            </a:r>
           </a:p>
           <a:p>
             <a:endParaRPr lang="en-US" dirty="0"/>
@@ -20137,38 +20128,21 @@
               <a:t>One liners, unlike here)</a:t>
             </a:r>
           </a:p>
-          <a:p>
-            <a:pPr marL="0" indent="0">
-              <a:buNone/>
-            </a:pPr>
-            <a:endParaRPr lang="en-US" dirty="0"/>
-          </a:p>
-          <a:p>
-            <a:pPr marL="0" indent="0">
-              <a:buNone/>
-            </a:pPr>
-            <a:r>
-              <a:rPr lang="en-US" dirty="0"/>
-              <a:t>All 3 are equivalent</a:t>
-            </a:r>
-          </a:p>
         </p:txBody>
       </p:sp>
       <p:pic>
         <p:nvPicPr>
-          <p:cNvPr id="8" name="Content Placeholder 7">
+          <p:cNvPr id="9" name="Picture 8">
             <a:extLst>
               <a:ext uri="{FF2B5EF4-FFF2-40B4-BE49-F238E27FC236}">
-                <a16:creationId xmlns:a16="http://schemas.microsoft.com/office/drawing/2014/main" id="{A5B8462F-028C-422F-84DF-BE2536607E38}"/>
+                <a16:creationId xmlns:a16="http://schemas.microsoft.com/office/drawing/2014/main" id="{1AC5D23C-B35F-46A7-885A-2C99F0EB3239}"/>
               </a:ext>
             </a:extLst>
           </p:cNvPr>
           <p:cNvPicPr>
-            <a:picLocks noGrp="1" noChangeAspect="1"/>
+            <a:picLocks noChangeAspect="1"/>
           </p:cNvPicPr>
-          <p:nvPr>
-            <p:ph sz="half" idx="2"/>
-          </p:nvPr>
+          <p:nvPr/>
         </p:nvPicPr>
         <p:blipFill>
           <a:blip r:embed="rId2"/>
@@ -20178,65 +20152,8 @@
         </p:blipFill>
         <p:spPr>
           <a:xfrm>
-            <a:off x="5706318" y="1964880"/>
-            <a:ext cx="4700588" cy="1244939"/>
-          </a:xfrm>
-        </p:spPr>
-      </p:pic>
-      <p:pic>
-        <p:nvPicPr>
-          <p:cNvPr id="10" name="Picture 9">
-            <a:extLst>
-              <a:ext uri="{FF2B5EF4-FFF2-40B4-BE49-F238E27FC236}">
-                <a16:creationId xmlns:a16="http://schemas.microsoft.com/office/drawing/2014/main" id="{6A2681F2-FEDB-4DCB-A4C0-D0CD0FFA1A95}"/>
-              </a:ext>
-            </a:extLst>
-          </p:cNvPr>
-          <p:cNvPicPr>
-            <a:picLocks noChangeAspect="1"/>
-          </p:cNvPicPr>
-          <p:nvPr/>
-        </p:nvPicPr>
-        <p:blipFill>
-          <a:blip r:embed="rId3"/>
-          <a:stretch>
-            <a:fillRect/>
-          </a:stretch>
-        </p:blipFill>
-        <p:spPr>
-          <a:xfrm>
-            <a:off x="5706318" y="3303384"/>
-            <a:ext cx="5895238" cy="1419048"/>
-          </a:xfrm>
-          <a:prstGeom prst="rect">
-            <a:avLst/>
-          </a:prstGeom>
-        </p:spPr>
-      </p:pic>
-      <p:pic>
-        <p:nvPicPr>
-          <p:cNvPr id="12" name="Picture 11">
-            <a:extLst>
-              <a:ext uri="{FF2B5EF4-FFF2-40B4-BE49-F238E27FC236}">
-                <a16:creationId xmlns:a16="http://schemas.microsoft.com/office/drawing/2014/main" id="{CD054991-6DD5-4F61-9211-409357AFF19C}"/>
-              </a:ext>
-            </a:extLst>
-          </p:cNvPr>
-          <p:cNvPicPr>
-            <a:picLocks noChangeAspect="1"/>
-          </p:cNvPicPr>
-          <p:nvPr/>
-        </p:nvPicPr>
-        <p:blipFill>
-          <a:blip r:embed="rId4"/>
-          <a:stretch>
-            <a:fillRect/>
-          </a:stretch>
-        </p:blipFill>
-        <p:spPr>
-          <a:xfrm>
-            <a:off x="5487251" y="4815997"/>
-            <a:ext cx="6638095" cy="980952"/>
+            <a:off x="5553905" y="2282839"/>
+            <a:ext cx="6638095" cy="4238095"/>
           </a:xfrm>
           <a:prstGeom prst="rect">
             <a:avLst/>
@@ -21813,15 +21730,16 @@
           <a:lstStyle/>
           <a:p>
             <a:r>
-              <a:rPr lang="en-US" dirty="0"/>
+              <a:rPr lang="en-US"/>
               <a:t>If the slide is orange, you can ask questions at the end of the slide. If it isn’t, please wait.</a:t>
             </a:r>
           </a:p>
           <a:p>
             <a:r>
-              <a:rPr lang="en-US" dirty="0"/>
+              <a:rPr lang="en-US"/>
               <a:t>Questions from last session</a:t>
             </a:r>
+            <a:endParaRPr lang="en-US" dirty="0"/>
           </a:p>
         </p:txBody>
       </p:sp>
@@ -21892,7 +21810,7 @@
       </p:grpSpPr>
       <p:pic>
         <p:nvPicPr>
-          <p:cNvPr id="11" name="Picture 10">
+          <p:cNvPr id="34" name="Picture 33">
             <a:extLst>
               <a:ext uri="{FF2B5EF4-FFF2-40B4-BE49-F238E27FC236}">
                 <a16:creationId xmlns:a16="http://schemas.microsoft.com/office/drawing/2014/main" id="{9B9C2B48-3899-4B1D-B526-C35DFD16BC01}"/>
@@ -21938,7 +21856,7 @@
       </p:pic>
       <p:pic>
         <p:nvPicPr>
-          <p:cNvPr id="13" name="Picture 12">
+          <p:cNvPr id="36" name="Picture 35">
             <a:extLst>
               <a:ext uri="{FF2B5EF4-FFF2-40B4-BE49-F238E27FC236}">
                 <a16:creationId xmlns:a16="http://schemas.microsoft.com/office/drawing/2014/main" id="{1A89A43D-53DA-411B-94AD-DEEF9B654AF3}"/>
@@ -21983,7 +21901,7 @@
       </p:pic>
       <p:pic>
         <p:nvPicPr>
-          <p:cNvPr id="15" name="Picture 14">
+          <p:cNvPr id="38" name="Picture 37">
             <a:extLst>
               <a:ext uri="{FF2B5EF4-FFF2-40B4-BE49-F238E27FC236}">
                 <a16:creationId xmlns:a16="http://schemas.microsoft.com/office/drawing/2014/main" id="{5D844A84-2EA4-4FF5-83FD-E14C9E8D7226}"/>
@@ -22028,7 +21946,7 @@
       </p:pic>
       <p:sp>
         <p:nvSpPr>
-          <p:cNvPr id="17" name="Rectangle 16">
+          <p:cNvPr id="40" name="Rectangle 39">
             <a:extLst>
               <a:ext uri="{FF2B5EF4-FFF2-40B4-BE49-F238E27FC236}">
                 <a16:creationId xmlns:a16="http://schemas.microsoft.com/office/drawing/2014/main" id="{6A23D1B2-B408-4913-9A1D-051C9DB38D55}"/>
@@ -22086,7 +22004,7 @@
       </p:sp>
       <p:sp>
         <p:nvSpPr>
-          <p:cNvPr id="19" name="Rectangle 18">
+          <p:cNvPr id="42" name="Rectangle 41">
             <a:extLst>
               <a:ext uri="{FF2B5EF4-FFF2-40B4-BE49-F238E27FC236}">
                 <a16:creationId xmlns:a16="http://schemas.microsoft.com/office/drawing/2014/main" id="{0189E329-C38B-4230-A181-B6B8BB9E1430}"/>
@@ -22141,10 +22059,10 @@
       </p:sp>
       <p:sp useBgFill="1">
         <p:nvSpPr>
-          <p:cNvPr id="21" name="Rectangle 20">
+          <p:cNvPr id="44" name="Rectangle 43">
             <a:extLst>
               <a:ext uri="{FF2B5EF4-FFF2-40B4-BE49-F238E27FC236}">
-                <a16:creationId xmlns:a16="http://schemas.microsoft.com/office/drawing/2014/main" id="{D77D54DE-D35C-41CF-B0BE-209030A71DB1}"/>
+                <a16:creationId xmlns:a16="http://schemas.microsoft.com/office/drawing/2014/main" id="{C267B0E0-0B85-4B6D-AFCD-0083F94E1F8C}"/>
               </a:ext>
               <a:ext uri="{C183D7F6-B498-43B3-948B-1728B52AA6E4}">
                 <adec:decorative xmlns:adec="http://schemas.microsoft.com/office/drawing/2017/decorative" val="1"/>
@@ -22201,10 +22119,10 @@
       </p:sp>
       <p:pic>
         <p:nvPicPr>
-          <p:cNvPr id="23" name="Picture 22">
+          <p:cNvPr id="46" name="Picture 45">
             <a:extLst>
               <a:ext uri="{FF2B5EF4-FFF2-40B4-BE49-F238E27FC236}">
-                <a16:creationId xmlns:a16="http://schemas.microsoft.com/office/drawing/2014/main" id="{C1BE412D-E43A-40F7-9D40-9A608E43CD4A}"/>
+                <a16:creationId xmlns:a16="http://schemas.microsoft.com/office/drawing/2014/main" id="{741DAC6C-9C47-44AD-89C8-BABF9484349B}"/>
               </a:ext>
               <a:ext uri="{C183D7F6-B498-43B3-948B-1728B52AA6E4}">
                 <adec:decorative xmlns:adec="http://schemas.microsoft.com/office/drawing/2017/decorative" val="1"/>
@@ -22247,10 +22165,10 @@
       </p:pic>
       <p:sp>
         <p:nvSpPr>
-          <p:cNvPr id="25" name="Rectangle 24">
+          <p:cNvPr id="48" name="Rectangle 47">
             <a:extLst>
               <a:ext uri="{FF2B5EF4-FFF2-40B4-BE49-F238E27FC236}">
-                <a16:creationId xmlns:a16="http://schemas.microsoft.com/office/drawing/2014/main" id="{7F1DCE60-EE3E-40AD-A094-D46BBD7D912A}"/>
+                <a16:creationId xmlns:a16="http://schemas.microsoft.com/office/drawing/2014/main" id="{1879D0B7-5E33-4D25-B4AC-FAC80502FC24}"/>
               </a:ext>
               <a:ext uri="{C183D7F6-B498-43B3-948B-1728B52AA6E4}">
                 <adec:decorative xmlns:adec="http://schemas.microsoft.com/office/drawing/2017/decorative" val="1"/>
@@ -22270,8 +22188,8 @@
         </p:nvSpPr>
         <p:spPr>
           <a:xfrm>
-            <a:off x="4644527" y="0"/>
-            <a:ext cx="7552944" cy="6858001"/>
+            <a:off x="6096000" y="0"/>
+            <a:ext cx="6092824" cy="6858001"/>
           </a:xfrm>
           <a:prstGeom prst="rect">
             <a:avLst/>
@@ -22307,10 +22225,10 @@
       </p:sp>
       <p:pic>
         <p:nvPicPr>
-          <p:cNvPr id="27" name="Picture 26">
+          <p:cNvPr id="50" name="Picture 49">
             <a:extLst>
               <a:ext uri="{FF2B5EF4-FFF2-40B4-BE49-F238E27FC236}">
-                <a16:creationId xmlns:a16="http://schemas.microsoft.com/office/drawing/2014/main" id="{0FD92A14-1D99-4216-ACAD-12048C4DF9B0}"/>
+                <a16:creationId xmlns:a16="http://schemas.microsoft.com/office/drawing/2014/main" id="{34A3F9D9-DEBA-4F2F-B136-85B1AEF091F2}"/>
               </a:ext>
               <a:ext uri="{C183D7F6-B498-43B3-948B-1728B52AA6E4}">
                 <adec:decorative xmlns:adec="http://schemas.microsoft.com/office/drawing/2017/decorative" val="1"/>
@@ -22329,7 +22247,7 @@
           </p:nvPr>
         </p:nvPicPr>
         <p:blipFill>
-          <a:blip r:embed="rId5" cstate="print">
+          <a:blip r:embed="rId3">
             <a:extLst>
               <a:ext uri="{28A0092B-C50C-407E-A947-70E740481C1C}">
                 <a14:useLocalDpi xmlns:a14="http://schemas.microsoft.com/office/drawing/2010/main" val="0"/>
@@ -22342,8 +22260,8 @@
         </p:blipFill>
         <p:spPr>
           <a:xfrm>
-            <a:off x="1" y="5006045"/>
-            <a:ext cx="4965192" cy="144049"/>
+            <a:off x="1" y="4688333"/>
+            <a:ext cx="6400800" cy="185701"/>
           </a:xfrm>
           <a:prstGeom prst="rect">
             <a:avLst/>
@@ -22352,10 +22270,10 @@
       </p:pic>
       <p:sp>
         <p:nvSpPr>
-          <p:cNvPr id="29" name="Rectangle 28">
+          <p:cNvPr id="52" name="Rectangle 51">
             <a:extLst>
               <a:ext uri="{FF2B5EF4-FFF2-40B4-BE49-F238E27FC236}">
-                <a16:creationId xmlns:a16="http://schemas.microsoft.com/office/drawing/2014/main" id="{85AB53B8-E9E6-4D13-AEB2-716CF5D06CDC}"/>
+                <a16:creationId xmlns:a16="http://schemas.microsoft.com/office/drawing/2014/main" id="{E75F9095-798C-4EF6-ABD0-3498021F8E54}"/>
               </a:ext>
               <a:ext uri="{C183D7F6-B498-43B3-948B-1728B52AA6E4}">
                 <adec:decorative xmlns:adec="http://schemas.microsoft.com/office/drawing/2017/decorative" val="1"/>
@@ -22375,8 +22293,8 @@
         </p:nvSpPr>
         <p:spPr>
           <a:xfrm>
-            <a:off x="-1" y="1838764"/>
-            <a:ext cx="4964567" cy="3180473"/>
+            <a:off x="-1" y="2162908"/>
+            <a:ext cx="6411743" cy="2532185"/>
           </a:xfrm>
           <a:prstGeom prst="rect">
             <a:avLst/>
@@ -22426,8 +22344,8 @@
         </p:nvSpPr>
         <p:spPr>
           <a:xfrm>
-            <a:off x="680322" y="2063262"/>
-            <a:ext cx="3739278" cy="2661138"/>
+            <a:off x="680322" y="2403231"/>
+            <a:ext cx="5192940" cy="2133600"/>
           </a:xfrm>
         </p:spPr>
         <p:txBody>
@@ -22438,7 +22356,7 @@
           <a:p>
             <a:pPr algn="r"/>
             <a:r>
-              <a:rPr lang="en-US" sz="4600" dirty="0"/>
+              <a:rPr lang="en-US" sz="5400"/>
               <a:t>Functions</a:t>
             </a:r>
           </a:p>
@@ -22462,8 +22380,8 @@
         </p:nvSpPr>
         <p:spPr>
           <a:xfrm>
-            <a:off x="680323" y="5101298"/>
-            <a:ext cx="3739277" cy="1116622"/>
+            <a:off x="680323" y="4831173"/>
+            <a:ext cx="5192940" cy="1117687"/>
           </a:xfrm>
         </p:spPr>
         <p:txBody>
@@ -22497,15 +22415,15 @@
           <p:nvPr/>
         </p:nvPicPr>
         <p:blipFill>
-          <a:blip r:embed="rId6"/>
+          <a:blip r:embed="rId5"/>
           <a:stretch>
             <a:fillRect/>
           </a:stretch>
         </p:blipFill>
         <p:spPr>
           <a:xfrm>
-            <a:off x="5471636" y="640080"/>
-            <a:ext cx="5886902" cy="5577840"/>
+            <a:off x="6736079" y="1150504"/>
+            <a:ext cx="4809490" cy="4556991"/>
           </a:xfrm>
           <a:prstGeom prst="rect">
             <a:avLst/>
@@ -23089,7 +23007,7 @@
           <a:lstStyle/>
           <a:p>
             <a:r>
-              <a:rPr lang="en-US" sz="2400"/>
+              <a:rPr lang="en-US" sz="2400" dirty="0"/>
               <a:t>Functions as arguments</a:t>
             </a:r>
           </a:p>
@@ -23169,34 +23087,34 @@
           <a:lstStyle/>
           <a:p>
             <a:r>
-              <a:rPr lang="en-US" sz="1400"/>
+              <a:rPr lang="en-US" sz="1400" dirty="0"/>
               <a:t>Another example</a:t>
             </a:r>
           </a:p>
           <a:p>
-            <a:endParaRPr lang="en-US" sz="1400"/>
-          </a:p>
-          <a:p>
-            <a:r>
-              <a:rPr lang="en-US" sz="1400"/>
+            <a:endParaRPr lang="en-US" sz="1400" dirty="0"/>
+          </a:p>
+          <a:p>
+            <a:r>
+              <a:rPr lang="en-US" sz="1400" dirty="0"/>
               <a:t>Map</a:t>
             </a:r>
           </a:p>
           <a:p>
             <a:r>
-              <a:rPr lang="en-US" sz="1400"/>
+              <a:rPr lang="en-US" sz="1400" dirty="0"/>
               <a:t>Where </a:t>
             </a:r>
           </a:p>
           <a:p>
             <a:r>
-              <a:rPr lang="en-US" sz="1400"/>
+              <a:rPr lang="en-US" sz="1400" dirty="0"/>
               <a:t>Reduce </a:t>
             </a:r>
           </a:p>
           <a:p>
             <a:r>
-              <a:rPr lang="en-US" sz="1400"/>
+              <a:rPr lang="en-US" sz="1400" dirty="0"/>
               <a:t>fold</a:t>
             </a:r>
           </a:p>
@@ -23246,6 +23164,144 @@
     <p:extLst>
       <p:ext uri="{BB962C8B-B14F-4D97-AF65-F5344CB8AC3E}">
         <p14:creationId xmlns:p14="http://schemas.microsoft.com/office/powerpoint/2010/main" val="1106468088"/>
+      </p:ext>
+    </p:extLst>
+  </p:cSld>
+  <p:clrMapOvr>
+    <a:masterClrMapping/>
+  </p:clrMapOvr>
+</p:sld>
+</file>
+
+<file path=ppt/slides/slide32.xml><?xml version="1.0" encoding="utf-8"?>
+<p:sld xmlns:a="http://schemas.openxmlformats.org/drawingml/2006/main" xmlns:r="http://schemas.openxmlformats.org/officeDocument/2006/relationships" xmlns:p="http://schemas.openxmlformats.org/presentationml/2006/main">
+  <p:cSld>
+    <p:spTree>
+      <p:nvGrpSpPr>
+        <p:cNvPr id="1" name=""/>
+        <p:cNvGrpSpPr/>
+        <p:nvPr/>
+      </p:nvGrpSpPr>
+      <p:grpSpPr>
+        <a:xfrm>
+          <a:off x="0" y="0"/>
+          <a:ext cx="0" cy="0"/>
+          <a:chOff x="0" y="0"/>
+          <a:chExt cx="0" cy="0"/>
+        </a:xfrm>
+      </p:grpSpPr>
+      <p:sp>
+        <p:nvSpPr>
+          <p:cNvPr id="2" name="Title 1">
+            <a:extLst>
+              <a:ext uri="{FF2B5EF4-FFF2-40B4-BE49-F238E27FC236}">
+                <a16:creationId xmlns:a16="http://schemas.microsoft.com/office/drawing/2014/main" id="{868193BD-FC57-4513-9B5F-59B51098A1C2}"/>
+              </a:ext>
+            </a:extLst>
+          </p:cNvPr>
+          <p:cNvSpPr>
+            <a:spLocks noGrp="1"/>
+          </p:cNvSpPr>
+          <p:nvPr>
+            <p:ph type="title"/>
+          </p:nvPr>
+        </p:nvSpPr>
+        <p:spPr/>
+        <p:txBody>
+          <a:bodyPr/>
+          <a:lstStyle/>
+          <a:p>
+            <a:r>
+              <a:rPr lang="en-US" dirty="0"/>
+              <a:t>Exercises</a:t>
+            </a:r>
+          </a:p>
+        </p:txBody>
+      </p:sp>
+      <p:sp>
+        <p:nvSpPr>
+          <p:cNvPr id="3" name="Content Placeholder 2">
+            <a:extLst>
+              <a:ext uri="{FF2B5EF4-FFF2-40B4-BE49-F238E27FC236}">
+                <a16:creationId xmlns:a16="http://schemas.microsoft.com/office/drawing/2014/main" id="{EDC75A92-C120-4663-8675-CC1C0721EC59}"/>
+              </a:ext>
+            </a:extLst>
+          </p:cNvPr>
+          <p:cNvSpPr>
+            <a:spLocks noGrp="1"/>
+          </p:cNvSpPr>
+          <p:nvPr>
+            <p:ph sz="half" idx="1"/>
+          </p:nvPr>
+        </p:nvSpPr>
+        <p:spPr/>
+        <p:txBody>
+          <a:bodyPr/>
+          <a:lstStyle/>
+          <a:p>
+            <a:r>
+              <a:rPr lang="en-US" dirty="0"/>
+              <a:t>There are 3 exercises</a:t>
+            </a:r>
+          </a:p>
+          <a:p>
+            <a:r>
+              <a:rPr lang="en-US" dirty="0"/>
+              <a:t>They each take 10-15 mins to make</a:t>
+            </a:r>
+          </a:p>
+          <a:p>
+            <a:r>
+              <a:rPr lang="en-US" dirty="0"/>
+              <a:t>Form a pair with someone for each exercise</a:t>
+            </a:r>
+          </a:p>
+          <a:p>
+            <a:r>
+              <a:rPr lang="en-US" dirty="0"/>
+              <a:t>Make them</a:t>
+            </a:r>
+          </a:p>
+          <a:p>
+            <a:r>
+              <a:rPr lang="en-US" dirty="0"/>
+              <a:t>Ask questions anytime </a:t>
+            </a:r>
+          </a:p>
+        </p:txBody>
+      </p:sp>
+      <p:sp>
+        <p:nvSpPr>
+          <p:cNvPr id="4" name="Content Placeholder 3">
+            <a:extLst>
+              <a:ext uri="{FF2B5EF4-FFF2-40B4-BE49-F238E27FC236}">
+                <a16:creationId xmlns:a16="http://schemas.microsoft.com/office/drawing/2014/main" id="{AD5D9CFD-E22F-42AE-8864-68B1AB0E1B6C}"/>
+              </a:ext>
+            </a:extLst>
+          </p:cNvPr>
+          <p:cNvSpPr>
+            <a:spLocks noGrp="1"/>
+          </p:cNvSpPr>
+          <p:nvPr>
+            <p:ph sz="half" idx="2"/>
+          </p:nvPr>
+        </p:nvSpPr>
+        <p:spPr/>
+        <p:txBody>
+          <a:bodyPr/>
+          <a:lstStyle/>
+          <a:p>
+            <a:r>
+              <a:rPr lang="en-US" dirty="0"/>
+              <a:t>We’ll go over 1 or 2 solutions for each exercise </a:t>
+            </a:r>
+          </a:p>
+        </p:txBody>
+      </p:sp>
+    </p:spTree>
+    <p:extLst>
+      <p:ext uri="{BB962C8B-B14F-4D97-AF65-F5344CB8AC3E}">
+        <p14:creationId xmlns:p14="http://schemas.microsoft.com/office/powerpoint/2010/main" val="1086595431"/>
       </p:ext>
     </p:extLst>
   </p:cSld>
@@ -24411,7 +24467,10 @@
           <a:bodyPr/>
           <a:lstStyle/>
           <a:p>
-            <a:endParaRPr lang="en-US"/>
+            <a:r>
+              <a:rPr lang="en-US" dirty="0"/>
+              <a:t>Dependencies </a:t>
+            </a:r>
           </a:p>
         </p:txBody>
       </p:sp>
@@ -24583,12 +24642,8 @@
           <a:lstStyle/>
           <a:p>
             <a:r>
-              <a:rPr lang="en-US" dirty="0" err="1"/>
-              <a:t>Arithmic</a:t>
-            </a:r>
-            <a:r>
               <a:rPr lang="en-US" dirty="0"/>
-              <a:t> operators</a:t>
+              <a:t>Arithmetic operators</a:t>
             </a:r>
           </a:p>
         </p:txBody>

</xml_diff>